<commit_message>
more for power point presentation
</commit_message>
<xml_diff>
--- a/Game Pitch/The Curator.pptx
+++ b/Game Pitch/The Curator.pptx
@@ -7,14 +7,15 @@
   <p:sldIdLst>
     <p:sldId id="256" r:id="rId2"/>
     <p:sldId id="257" r:id="rId3"/>
-    <p:sldId id="258" r:id="rId4"/>
-    <p:sldId id="259" r:id="rId5"/>
-    <p:sldId id="260" r:id="rId6"/>
-    <p:sldId id="261" r:id="rId7"/>
-    <p:sldId id="262" r:id="rId8"/>
-    <p:sldId id="263" r:id="rId9"/>
-    <p:sldId id="264" r:id="rId10"/>
-    <p:sldId id="265" r:id="rId11"/>
+    <p:sldId id="266" r:id="rId4"/>
+    <p:sldId id="258" r:id="rId5"/>
+    <p:sldId id="259" r:id="rId6"/>
+    <p:sldId id="260" r:id="rId7"/>
+    <p:sldId id="261" r:id="rId8"/>
+    <p:sldId id="262" r:id="rId9"/>
+    <p:sldId id="263" r:id="rId10"/>
+    <p:sldId id="264" r:id="rId11"/>
+    <p:sldId id="265" r:id="rId12"/>
   </p:sldIdLst>
   <p:sldSz cx="12192000" cy="6858000"/>
   <p:notesSz cx="6858000" cy="9144000"/>
@@ -113,6 +114,11 @@
       </a:defRPr>
     </a:lvl9pPr>
   </p:defaultTextStyle>
+  <p:extLst>
+    <p:ext uri="{EFAFB233-063F-42B5-8137-9DF3F51BA10A}">
+      <p15:sldGuideLst xmlns:p15="http://schemas.microsoft.com/office/powerpoint/2012/main"/>
+    </p:ext>
+  </p:extLst>
 </p:presentation>
 </file>
 
@@ -278,7 +284,7 @@
           <a:p>
             <a:fld id="{ECD19FB2-3AAB-4D03-B13A-2960828C78E3}" type="datetimeFigureOut">
               <a:rPr lang="en-US" dirty="0"/>
-              <a:t>12/4/2016</a:t>
+              <a:t>12/5/2016</a:t>
             </a:fld>
             <a:endParaRPr lang="en-US" dirty="0"/>
           </a:p>
@@ -555,7 +561,7 @@
           <a:p>
             <a:fld id="{1B80C674-7DFC-42FE-B9CD-82963CDB1557}" type="datetimeFigureOut">
               <a:rPr lang="en-US" dirty="0"/>
-              <a:t>12/4/2016</a:t>
+              <a:t>12/5/2016</a:t>
             </a:fld>
             <a:endParaRPr lang="en-US" dirty="0"/>
           </a:p>
@@ -742,7 +748,7 @@
           <a:p>
             <a:fld id="{2076456F-F47D-4F25-8053-2A695DA0CA7D}" type="datetimeFigureOut">
               <a:rPr lang="en-US" dirty="0"/>
-              <a:t>12/4/2016</a:t>
+              <a:t>12/5/2016</a:t>
             </a:fld>
             <a:endParaRPr lang="en-US" dirty="0"/>
           </a:p>
@@ -998,7 +1004,7 @@
           <a:p>
             <a:fld id="{5D6C7379-69CC-4837-9905-BEBA22830C8A}" type="datetimeFigureOut">
               <a:rPr lang="en-US" dirty="0"/>
-              <a:t>12/4/2016</a:t>
+              <a:t>12/5/2016</a:t>
             </a:fld>
             <a:endParaRPr lang="en-US" dirty="0"/>
           </a:p>
@@ -1419,7 +1425,7 @@
           <a:p>
             <a:fld id="{49EB8B7E-8AEE-4F10-BFEE-C999AD004D36}" type="datetimeFigureOut">
               <a:rPr lang="en-US" dirty="0"/>
-              <a:t>12/4/2016</a:t>
+              <a:t>12/5/2016</a:t>
             </a:fld>
             <a:endParaRPr lang="en-US" dirty="0"/>
           </a:p>
@@ -1960,7 +1966,7 @@
           <a:p>
             <a:fld id="{8668F3F9-58BC-440B-B37B-805B9055EF92}" type="datetimeFigureOut">
               <a:rPr lang="en-US" dirty="0"/>
-              <a:t>12/4/2016</a:t>
+              <a:t>12/5/2016</a:t>
             </a:fld>
             <a:endParaRPr lang="en-US" dirty="0"/>
           </a:p>
@@ -2786,7 +2792,7 @@
           <a:p>
             <a:fld id="{0D5A53AF-48EA-489D-8260-9DCAB666386A}" type="datetimeFigureOut">
               <a:rPr lang="en-US" dirty="0"/>
-              <a:t>12/4/2016</a:t>
+              <a:t>12/5/2016</a:t>
             </a:fld>
             <a:endParaRPr lang="en-US" dirty="0"/>
           </a:p>
@@ -2951,7 +2957,7 @@
           <a:p>
             <a:fld id="{0DED02AE-B9A4-47BD-AF8E-97E16144138B}" type="datetimeFigureOut">
               <a:rPr lang="en-US" dirty="0"/>
-              <a:t>12/4/2016</a:t>
+              <a:t>12/5/2016</a:t>
             </a:fld>
             <a:endParaRPr lang="en-US" dirty="0"/>
           </a:p>
@@ -3126,7 +3132,7 @@
           <a:p>
             <a:fld id="{CF0FD78B-DB02-4362-BCDC-98A55456977C}" type="datetimeFigureOut">
               <a:rPr lang="en-US" dirty="0"/>
-              <a:t>12/4/2016</a:t>
+              <a:t>12/5/2016</a:t>
             </a:fld>
             <a:endParaRPr lang="en-US" dirty="0"/>
           </a:p>
@@ -3291,7 +3297,7 @@
           <a:p>
             <a:fld id="{99916976-5D93-46E4-A98A-FAD63E4D0EA8}" type="datetimeFigureOut">
               <a:rPr lang="en-US" dirty="0"/>
-              <a:t>12/4/2016</a:t>
+              <a:t>12/5/2016</a:t>
             </a:fld>
             <a:endParaRPr lang="en-US" dirty="0"/>
           </a:p>
@@ -3543,7 +3549,7 @@
           <a:p>
             <a:fld id="{0F39F4F5-F4D2-4D2A-AB60-88D37ADCB869}" type="datetimeFigureOut">
               <a:rPr lang="en-US" dirty="0"/>
-              <a:t>12/4/2016</a:t>
+              <a:t>12/5/2016</a:t>
             </a:fld>
             <a:endParaRPr lang="en-US" dirty="0"/>
           </a:p>
@@ -3770,7 +3776,7 @@
           <a:p>
             <a:fld id="{D23BC6CE-6D1E-47E5-8859-F31AC5380EB2}" type="datetimeFigureOut">
               <a:rPr lang="en-US" dirty="0"/>
-              <a:t>12/4/2016</a:t>
+              <a:t>12/5/2016</a:t>
             </a:fld>
             <a:endParaRPr lang="en-US" dirty="0"/>
           </a:p>
@@ -4158,7 +4164,7 @@
           <a:p>
             <a:fld id="{B1B4E7C4-4DA4-404D-9965-B13F2DD7D8BF}" type="datetimeFigureOut">
               <a:rPr lang="en-US" dirty="0"/>
-              <a:t>12/4/2016</a:t>
+              <a:t>12/5/2016</a:t>
             </a:fld>
             <a:endParaRPr lang="en-US" dirty="0"/>
           </a:p>
@@ -4271,7 +4277,7 @@
           <a:p>
             <a:fld id="{476FB7AA-4A53-424F-AD41-70827B6504BA}" type="datetimeFigureOut">
               <a:rPr lang="en-US" dirty="0"/>
-              <a:t>12/4/2016</a:t>
+              <a:t>12/5/2016</a:t>
             </a:fld>
             <a:endParaRPr lang="en-US" dirty="0"/>
           </a:p>
@@ -4361,7 +4367,7 @@
           <a:p>
             <a:fld id="{E7884882-FB12-4BC8-9960-9AD8104D7FAE}" type="datetimeFigureOut">
               <a:rPr lang="en-US" dirty="0"/>
-              <a:t>12/4/2016</a:t>
+              <a:t>12/5/2016</a:t>
             </a:fld>
             <a:endParaRPr lang="en-US" dirty="0"/>
           </a:p>
@@ -4629,7 +4635,7 @@
           <a:p>
             <a:fld id="{F7D1BD23-6E54-4D9D-AD88-A2813C73CC25}" type="datetimeFigureOut">
               <a:rPr lang="en-US" dirty="0"/>
-              <a:t>12/4/2016</a:t>
+              <a:t>12/5/2016</a:t>
             </a:fld>
             <a:endParaRPr lang="en-US" dirty="0"/>
           </a:p>
@@ -4905,7 +4911,7 @@
           <a:p>
             <a:fld id="{1471A834-4F3C-4AF9-9C74-05EC35A0F292}" type="datetimeFigureOut">
               <a:rPr lang="en-US" dirty="0"/>
-              <a:t>12/4/2016</a:t>
+              <a:t>12/5/2016</a:t>
             </a:fld>
             <a:endParaRPr lang="en-US" dirty="0"/>
           </a:p>
@@ -5140,7 +5146,7 @@
           <a:p>
             <a:fld id="{51CF1133-3259-4C45-BABA-5B62D9C6F78D}" type="datetimeFigureOut">
               <a:rPr lang="en-US" dirty="0"/>
-              <a:t>12/4/2016</a:t>
+              <a:t>12/5/2016</a:t>
             </a:fld>
             <a:endParaRPr lang="en-US" dirty="0"/>
           </a:p>
@@ -5733,20 +5739,18 @@
         </p:nvSpPr>
         <p:spPr/>
         <p:txBody>
-          <a:bodyPr/>
-          <a:lstStyle/>
-          <a:p>
+          <a:bodyPr>
+            <a:normAutofit/>
+          </a:bodyPr>
+          <a:lstStyle/>
+          <a:p>
+            <a:r>
+              <a:rPr lang="en-GB" dirty="0" err="1"/>
+              <a:t>Dodo_Down</a:t>
+            </a:r>
             <a:r>
               <a:rPr lang="en-GB" dirty="0"/>
-              <a:t>Kek-8 / </a:t>
-            </a:r>
-            <a:r>
-              <a:rPr lang="en-GB" dirty="0" err="1"/>
-              <a:t>PeP</a:t>
-            </a:r>
-            <a:r>
-              <a:rPr lang="en-GB" dirty="0"/>
-              <a:t>-Hate / Mage against the Regime presents</a:t>
+              <a:t> presents</a:t>
             </a:r>
           </a:p>
         </p:txBody>
@@ -5783,18 +5787,18 @@
       </p:grpSpPr>
       <p:sp>
         <p:nvSpPr>
-          <p:cNvPr id="3" name="Text Placeholder 2"/>
-          <p:cNvSpPr>
-            <a:spLocks noGrp="1"/>
-          </p:cNvSpPr>
-          <p:nvPr>
-            <p:ph type="body" sz="half" idx="2"/>
-          </p:nvPr>
-        </p:nvSpPr>
-        <p:spPr>
-          <a:xfrm>
-            <a:off x="1817983" y="3835359"/>
-            <a:ext cx="10514012" cy="1501826"/>
+          <p:cNvPr id="2" name="Title 1"/>
+          <p:cNvSpPr>
+            <a:spLocks noGrp="1"/>
+          </p:cNvSpPr>
+          <p:nvPr>
+            <p:ph type="title"/>
+          </p:nvPr>
+        </p:nvSpPr>
+        <p:spPr>
+          <a:xfrm rot="21282863">
+            <a:off x="1220972" y="864854"/>
+            <a:ext cx="10515600" cy="1325563"/>
           </a:xfrm>
         </p:spPr>
         <p:txBody>
@@ -5803,15 +5807,71 @@
           <a:p>
             <a:r>
               <a:rPr lang="en-GB" sz="7200" dirty="0"/>
-              <a:t>Questions?</a:t>
-            </a:r>
-            <a:endParaRPr lang="en-GB" dirty="0"/>
+              <a:t>Live</a:t>
+            </a:r>
+            <a:r>
+              <a:rPr lang="en-GB" dirty="0"/>
+              <a:t> demonstration</a:t>
+            </a:r>
           </a:p>
         </p:txBody>
       </p:sp>
       <p:pic>
         <p:nvPicPr>
-          <p:cNvPr id="4" name="Picture 3"/>
+          <p:cNvPr id="4" name="Content Placeholder 3"/>
+          <p:cNvPicPr>
+            <a:picLocks noGrp="1" noChangeAspect="1"/>
+          </p:cNvPicPr>
+          <p:nvPr>
+            <p:ph idx="1"/>
+          </p:nvPr>
+        </p:nvPicPr>
+        <p:blipFill>
+          <a:blip r:embed="rId2"/>
+          <a:stretch>
+            <a:fillRect/>
+          </a:stretch>
+        </p:blipFill>
+        <p:spPr>
+          <a:xfrm>
+            <a:off x="2506681" y="890532"/>
+            <a:ext cx="5967468" cy="5967468"/>
+          </a:xfrm>
+        </p:spPr>
+      </p:pic>
+    </p:spTree>
+    <p:extLst>
+      <p:ext uri="{BB962C8B-B14F-4D97-AF65-F5344CB8AC3E}">
+        <p14:creationId xmlns:p14="http://schemas.microsoft.com/office/powerpoint/2010/main" val="3674195138"/>
+      </p:ext>
+    </p:extLst>
+  </p:cSld>
+  <p:clrMapOvr>
+    <a:masterClrMapping/>
+  </p:clrMapOvr>
+</p:sld>
+</file>
+
+<file path=ppt/slides/slide11.xml><?xml version="1.0" encoding="utf-8"?>
+<p:sld xmlns:a="http://schemas.openxmlformats.org/drawingml/2006/main" xmlns:r="http://schemas.openxmlformats.org/officeDocument/2006/relationships" xmlns:p="http://schemas.openxmlformats.org/presentationml/2006/main">
+  <p:cSld>
+    <p:spTree>
+      <p:nvGrpSpPr>
+        <p:cNvPr id="1" name=""/>
+        <p:cNvGrpSpPr/>
+        <p:nvPr/>
+      </p:nvGrpSpPr>
+      <p:grpSpPr>
+        <a:xfrm>
+          <a:off x="0" y="0"/>
+          <a:ext cx="0" cy="0"/>
+          <a:chOff x="0" y="0"/>
+          <a:chExt cx="0" cy="0"/>
+        </a:xfrm>
+      </p:grpSpPr>
+      <p:pic>
+        <p:nvPicPr>
+          <p:cNvPr id="2" name="Picture 1"/>
           <p:cNvPicPr>
             <a:picLocks noChangeAspect="1"/>
           </p:cNvPicPr>
@@ -5825,17 +5885,49 @@
         </p:blipFill>
         <p:spPr>
           <a:xfrm>
-            <a:off x="5847907" y="1146522"/>
-            <a:ext cx="5505893" cy="5505893"/>
+            <a:off x="-127591" y="-1520815"/>
+            <a:ext cx="12192000" cy="6858000"/>
           </a:xfrm>
           <a:prstGeom prst="rect">
             <a:avLst/>
           </a:prstGeom>
         </p:spPr>
       </p:pic>
+      <p:sp>
+        <p:nvSpPr>
+          <p:cNvPr id="3" name="Text Placeholder 2"/>
+          <p:cNvSpPr>
+            <a:spLocks noGrp="1"/>
+          </p:cNvSpPr>
+          <p:nvPr>
+            <p:ph type="body" sz="half" idx="2"/>
+          </p:nvPr>
+        </p:nvSpPr>
+        <p:spPr>
+          <a:xfrm rot="9728515">
+            <a:off x="-4038455" y="4622904"/>
+            <a:ext cx="10952615" cy="1835277"/>
+          </a:xfrm>
+        </p:spPr>
+        <p:txBody>
+          <a:bodyPr/>
+          <a:lstStyle/>
+          <a:p>
+            <a:r>
+              <a:rPr lang="en-GB" sz="7200" dirty="0"/>
+              <a:t>¿</a:t>
+            </a:r>
+            <a:r>
+              <a:rPr lang="en-GB" sz="7200" dirty="0"/>
+              <a:t>Questions?</a:t>
+            </a:r>
+            <a:endParaRPr lang="en-GB" dirty="0"/>
+          </a:p>
+        </p:txBody>
+      </p:sp>
       <p:pic>
         <p:nvPicPr>
-          <p:cNvPr id="5" name="Picture 4"/>
+          <p:cNvPr id="4" name="Picture 3"/>
           <p:cNvPicPr>
             <a:picLocks noChangeAspect="1"/>
           </p:cNvPicPr>
@@ -5849,8 +5941,8 @@
         </p:blipFill>
         <p:spPr>
           <a:xfrm>
-            <a:off x="1967023" y="955969"/>
-            <a:ext cx="8027582" cy="2696572"/>
+            <a:off x="5847907" y="1146522"/>
+            <a:ext cx="5505893" cy="5505893"/>
           </a:xfrm>
           <a:prstGeom prst="rect">
             <a:avLst/>
@@ -5887,45 +5979,9 @@
           <a:chExt cx="0" cy="0"/>
         </a:xfrm>
       </p:grpSpPr>
-      <p:sp>
-        <p:nvSpPr>
-          <p:cNvPr id="2" name="Title 1"/>
-          <p:cNvSpPr>
-            <a:spLocks noGrp="1"/>
-          </p:cNvSpPr>
-          <p:nvPr>
-            <p:ph type="title"/>
-          </p:nvPr>
-        </p:nvSpPr>
-        <p:spPr>
-          <a:xfrm>
-            <a:off x="842327" y="4624845"/>
-            <a:ext cx="10515600" cy="1325563"/>
-          </a:xfrm>
-        </p:spPr>
-        <p:txBody>
-          <a:bodyPr>
-            <a:noAutofit/>
-          </a:bodyPr>
-          <a:lstStyle/>
-          <a:p>
-            <a:r>
-              <a:rPr lang="en-GB" sz="4400" dirty="0"/>
-              <a:t>A simple pixel art shooter/puzzler </a:t>
-            </a:r>
-            <a:br>
-              <a:rPr lang="en-GB" sz="4400" dirty="0"/>
-            </a:br>
-            <a:r>
-              <a:rPr lang="en-GB" sz="4400" dirty="0"/>
-              <a:t>set across the ages</a:t>
-            </a:r>
-          </a:p>
-        </p:txBody>
-      </p:sp>
       <p:pic>
         <p:nvPicPr>
-          <p:cNvPr id="4" name="Content Placeholder 3"/>
+          <p:cNvPr id="5" name="Content Placeholder 4"/>
           <p:cNvPicPr>
             <a:picLocks noGrp="1" noChangeAspect="1"/>
           </p:cNvPicPr>
@@ -5941,8 +5997,8 @@
         </p:blipFill>
         <p:spPr>
           <a:xfrm>
-            <a:off x="983614" y="624264"/>
-            <a:ext cx="10233025" cy="3437409"/>
+            <a:off x="-2384041" y="-1955966"/>
+            <a:ext cx="16729529" cy="9410361"/>
           </a:xfrm>
         </p:spPr>
       </p:pic>
@@ -5976,13 +6032,53 @@
           <a:chExt cx="0" cy="0"/>
         </a:xfrm>
       </p:grpSpPr>
+      <p:sp>
+        <p:nvSpPr>
+          <p:cNvPr id="2" name="Title 1"/>
+          <p:cNvSpPr>
+            <a:spLocks noGrp="1"/>
+          </p:cNvSpPr>
+          <p:nvPr>
+            <p:ph type="title"/>
+          </p:nvPr>
+        </p:nvSpPr>
+        <p:spPr>
+          <a:xfrm rot="21449188">
+            <a:off x="540488" y="609674"/>
+            <a:ext cx="10515600" cy="1325563"/>
+          </a:xfrm>
+        </p:spPr>
+        <p:txBody>
+          <a:bodyPr>
+            <a:normAutofit fontScale="90000"/>
+          </a:bodyPr>
+          <a:lstStyle/>
+          <a:p>
+            <a:pPr algn="ctr"/>
+            <a:r>
+              <a:rPr lang="en-GB" dirty="0"/>
+              <a:t>A simple pixel art shooter/puzzler </a:t>
+            </a:r>
+            <a:br>
+              <a:rPr lang="en-GB" dirty="0"/>
+            </a:br>
+            <a:r>
+              <a:rPr lang="en-GB" dirty="0"/>
+              <a:t>set across the ages</a:t>
+            </a:r>
+            <a:endParaRPr lang="en-GB" dirty="0"/>
+          </a:p>
+        </p:txBody>
+      </p:sp>
       <p:pic>
         <p:nvPicPr>
-          <p:cNvPr id="4" name="Picture 3"/>
+          <p:cNvPr id="4" name="Content Placeholder 3"/>
           <p:cNvPicPr>
-            <a:picLocks noChangeAspect="1"/>
+            <a:picLocks noGrp="1" noChangeAspect="1"/>
           </p:cNvPicPr>
-          <p:nvPr/>
+          <p:nvPr>
+            <p:ph idx="1"/>
+          </p:nvPr>
         </p:nvPicPr>
         <p:blipFill>
           <a:blip r:embed="rId2"/>
@@ -5992,87 +6088,15 @@
         </p:blipFill>
         <p:spPr>
           <a:xfrm>
-            <a:off x="7995683" y="1300163"/>
-            <a:ext cx="4876800" cy="4876800"/>
-          </a:xfrm>
-          <a:prstGeom prst="rect">
-            <a:avLst/>
-          </a:prstGeom>
+            <a:off x="2488018" y="209495"/>
+            <a:ext cx="6063161" cy="6063161"/>
+          </a:xfrm>
         </p:spPr>
       </p:pic>
-      <p:sp>
-        <p:nvSpPr>
-          <p:cNvPr id="2" name="Title 1"/>
-          <p:cNvSpPr>
-            <a:spLocks noGrp="1"/>
-          </p:cNvSpPr>
-          <p:nvPr>
-            <p:ph type="title"/>
-          </p:nvPr>
-        </p:nvSpPr>
-        <p:spPr/>
-        <p:txBody>
-          <a:bodyPr/>
-          <a:lstStyle/>
-          <a:p>
-            <a:r>
-              <a:rPr lang="en-GB" dirty="0"/>
-              <a:t>Overview</a:t>
-            </a:r>
-          </a:p>
-        </p:txBody>
-      </p:sp>
-      <p:sp>
-        <p:nvSpPr>
-          <p:cNvPr id="3" name="Content Placeholder 2"/>
-          <p:cNvSpPr>
-            <a:spLocks noGrp="1"/>
-          </p:cNvSpPr>
-          <p:nvPr>
-            <p:ph idx="1"/>
-          </p:nvPr>
-        </p:nvSpPr>
-        <p:spPr>
-          <a:xfrm>
-            <a:off x="1120000" y="1825625"/>
-            <a:ext cx="7662493" cy="4351338"/>
-          </a:xfrm>
-        </p:spPr>
-        <p:txBody>
-          <a:bodyPr>
-            <a:normAutofit fontScale="92500" lnSpcReduction="10000"/>
-          </a:bodyPr>
-          <a:lstStyle/>
-          <a:p>
-            <a:r>
-              <a:rPr lang="en-GB" dirty="0"/>
-              <a:t>As ‘The Curator’ you are tasked with retrieving artefacts from throughout time for a museum in the future.</a:t>
-            </a:r>
-          </a:p>
-          <a:p>
-            <a:r>
-              <a:rPr lang="en-GB" dirty="0"/>
-              <a:t>With an air of nonchalance, his relaxed demeanour is designed to contrast the fast and dangerous enemies.</a:t>
-            </a:r>
-          </a:p>
-          <a:p>
-            <a:r>
-              <a:rPr lang="en-GB" dirty="0"/>
-              <a:t>With the aesthetic freedom of any time period, each level or ‘Era’ can vary in style from fast paced shooting, to sneaking, or more.</a:t>
-            </a:r>
-          </a:p>
-          <a:p>
-            <a:r>
-              <a:rPr lang="en-GB" dirty="0"/>
-              <a:t>Individual storylines can be woven into each Era, varying as much as the enemies that inhabit them.</a:t>
-            </a:r>
-          </a:p>
-        </p:txBody>
-      </p:sp>
     </p:spTree>
     <p:extLst>
       <p:ext uri="{BB962C8B-B14F-4D97-AF65-F5344CB8AC3E}">
-        <p14:creationId xmlns:p14="http://schemas.microsoft.com/office/powerpoint/2010/main" val="1588007399"/>
+        <p14:creationId xmlns:p14="http://schemas.microsoft.com/office/powerpoint/2010/main" val="3079544137"/>
       </p:ext>
     </p:extLst>
   </p:cSld>
@@ -6099,86 +6123,9 @@
           <a:chExt cx="0" cy="0"/>
         </a:xfrm>
       </p:grpSpPr>
-      <p:sp>
-        <p:nvSpPr>
-          <p:cNvPr id="2" name="Title 1"/>
-          <p:cNvSpPr>
-            <a:spLocks noGrp="1"/>
-          </p:cNvSpPr>
-          <p:nvPr>
-            <p:ph type="title"/>
-          </p:nvPr>
-        </p:nvSpPr>
-        <p:spPr/>
-        <p:txBody>
-          <a:bodyPr/>
-          <a:lstStyle/>
-          <a:p>
-            <a:r>
-              <a:rPr lang="en-GB" dirty="0"/>
-              <a:t>Hooks and USPs</a:t>
-            </a:r>
-          </a:p>
-        </p:txBody>
-      </p:sp>
-      <p:sp>
-        <p:nvSpPr>
-          <p:cNvPr id="3" name="Content Placeholder 2"/>
-          <p:cNvSpPr>
-            <a:spLocks noGrp="1"/>
-          </p:cNvSpPr>
-          <p:nvPr>
-            <p:ph idx="1"/>
-          </p:nvPr>
-        </p:nvSpPr>
-        <p:spPr>
-          <a:xfrm>
-            <a:off x="1120000" y="1825625"/>
-            <a:ext cx="8481200" cy="4351338"/>
-          </a:xfrm>
-        </p:spPr>
-        <p:txBody>
-          <a:bodyPr>
-            <a:normAutofit/>
-          </a:bodyPr>
-          <a:lstStyle/>
-          <a:p>
-            <a:r>
-              <a:rPr lang="en-GB" dirty="0"/>
-              <a:t>Time travel allows an unlimited variety of level themes.</a:t>
-            </a:r>
-            <a:endParaRPr lang="en-GB" dirty="0"/>
-          </a:p>
-          <a:p>
-            <a:r>
-              <a:rPr lang="en-GB" dirty="0"/>
-              <a:t>Allowing the use of futuristic weapons in the past. </a:t>
-            </a:r>
-            <a:endParaRPr lang="en-GB" dirty="0"/>
-          </a:p>
-          <a:p>
-            <a:r>
-              <a:rPr lang="en-GB" dirty="0"/>
-              <a:t>Eras can be any moment in Earths history; from the age of the dinosaurs, to World War Two.</a:t>
-            </a:r>
-          </a:p>
-          <a:p>
-            <a:r>
-              <a:rPr lang="en-GB" dirty="0"/>
-              <a:t>Future Eras allow aliens and robots.</a:t>
-            </a:r>
-          </a:p>
-          <a:p>
-            <a:r>
-              <a:rPr lang="en-GB" dirty="0"/>
-              <a:t>The requirement being that there is an object of historical importance located there worth curating. Assuming that the time machine doesn’t suddenly start breaking…</a:t>
-            </a:r>
-          </a:p>
-        </p:txBody>
-      </p:sp>
       <p:pic>
         <p:nvPicPr>
-          <p:cNvPr id="6" name="Picture 5"/>
+          <p:cNvPr id="4" name="Picture 3"/>
           <p:cNvPicPr>
             <a:picLocks noChangeAspect="1"/>
           </p:cNvPicPr>
@@ -6200,10 +6147,58 @@
           </a:prstGeom>
         </p:spPr>
       </p:pic>
+      <p:sp>
+        <p:nvSpPr>
+          <p:cNvPr id="3" name="Content Placeholder 2"/>
+          <p:cNvSpPr>
+            <a:spLocks noGrp="1"/>
+          </p:cNvSpPr>
+          <p:nvPr>
+            <p:ph idx="1"/>
+          </p:nvPr>
+        </p:nvSpPr>
+        <p:spPr>
+          <a:xfrm rot="21322354">
+            <a:off x="892126" y="1453649"/>
+            <a:ext cx="8358181" cy="3327524"/>
+          </a:xfrm>
+        </p:spPr>
+        <p:txBody>
+          <a:bodyPr>
+            <a:normAutofit/>
+          </a:bodyPr>
+          <a:lstStyle/>
+          <a:p>
+            <a:pPr marL="0" indent="0">
+              <a:buNone/>
+            </a:pPr>
+            <a:r>
+              <a:rPr lang="en-GB" sz="4000" dirty="0"/>
+              <a:t>As </a:t>
+            </a:r>
+            <a:r>
+              <a:rPr lang="en-GB" sz="6600" dirty="0"/>
+              <a:t>‘The Curator’ </a:t>
+            </a:r>
+            <a:r>
+              <a:rPr lang="en-GB" sz="4000" dirty="0"/>
+              <a:t>you are tasked with retrieving </a:t>
+            </a:r>
+            <a:r>
+              <a:rPr lang="en-GB" sz="4800" dirty="0" err="1"/>
+              <a:t>artifacts</a:t>
+            </a:r>
+            <a:r>
+              <a:rPr lang="en-GB" sz="4000" dirty="0"/>
+              <a:t> from throughout time for a museum in the future.</a:t>
+            </a:r>
+          </a:p>
+        </p:txBody>
+      </p:sp>
     </p:spTree>
     <p:extLst>
       <p:ext uri="{BB962C8B-B14F-4D97-AF65-F5344CB8AC3E}">
-        <p14:creationId xmlns:p14="http://schemas.microsoft.com/office/powerpoint/2010/main" val="3120065655"/>
+        <p14:creationId xmlns:p14="http://schemas.microsoft.com/office/powerpoint/2010/main" val="1588007399"/>
       </p:ext>
     </p:extLst>
   </p:cSld>
@@ -6232,28 +6227,6 @@
       </p:grpSpPr>
       <p:sp>
         <p:nvSpPr>
-          <p:cNvPr id="2" name="Title 1"/>
-          <p:cNvSpPr>
-            <a:spLocks noGrp="1"/>
-          </p:cNvSpPr>
-          <p:nvPr>
-            <p:ph type="title"/>
-          </p:nvPr>
-        </p:nvSpPr>
-        <p:spPr/>
-        <p:txBody>
-          <a:bodyPr/>
-          <a:lstStyle/>
-          <a:p>
-            <a:r>
-              <a:rPr lang="en-GB" dirty="0"/>
-              <a:t>Gameplay</a:t>
-            </a:r>
-          </a:p>
-        </p:txBody>
-      </p:sp>
-      <p:sp>
-        <p:nvSpPr>
           <p:cNvPr id="3" name="Content Placeholder 2"/>
           <p:cNvSpPr>
             <a:spLocks noGrp="1"/>
@@ -6263,58 +6236,42 @@
           </p:nvPr>
         </p:nvSpPr>
         <p:spPr>
-          <a:xfrm>
-            <a:off x="1120000" y="1825625"/>
-            <a:ext cx="7694391" cy="4351338"/>
-          </a:xfrm>
-        </p:spPr>
-        <p:txBody>
-          <a:bodyPr/>
-          <a:lstStyle/>
-          <a:p>
-            <a:r>
-              <a:rPr lang="en-GB" dirty="0"/>
-              <a:t>Single player.</a:t>
-            </a:r>
-          </a:p>
-          <a:p>
-            <a:r>
-              <a:rPr lang="en-GB" dirty="0"/>
-              <a:t>Keyboard and mouse controls.</a:t>
-            </a:r>
-          </a:p>
-          <a:p>
-            <a:r>
-              <a:rPr lang="en-GB" dirty="0"/>
-              <a:t>Sneaking through mazes past patrolling enemies.</a:t>
-            </a:r>
-          </a:p>
-          <a:p>
-            <a:r>
-              <a:rPr lang="en-GB" dirty="0"/>
-              <a:t>Top down shooter sections, wave defence, and boss battles.</a:t>
-            </a:r>
-          </a:p>
-          <a:p>
-            <a:r>
-              <a:rPr lang="en-GB" dirty="0"/>
-              <a:t>Easily approachable with simple controls.</a:t>
-            </a:r>
-          </a:p>
-          <a:p>
-            <a:r>
-              <a:rPr lang="en-GB" dirty="0"/>
-              <a:t>Short levels designed to be completed in one session.</a:t>
-            </a:r>
-          </a:p>
-          <a:p>
-            <a:endParaRPr lang="en-GB" dirty="0"/>
+          <a:xfrm rot="21269136">
+            <a:off x="546226" y="1718615"/>
+            <a:ext cx="8832594" cy="2565622"/>
+          </a:xfrm>
+        </p:spPr>
+        <p:txBody>
+          <a:bodyPr>
+            <a:normAutofit/>
+          </a:bodyPr>
+          <a:lstStyle/>
+          <a:p>
+            <a:pPr marL="0" indent="0" algn="ctr">
+              <a:buNone/>
+            </a:pPr>
+            <a:r>
+              <a:rPr lang="en-GB" sz="5400" dirty="0"/>
+              <a:t>Time travel </a:t>
+            </a:r>
+            <a:r>
+              <a:rPr lang="en-GB" sz="4000" dirty="0"/>
+              <a:t>allows an </a:t>
+            </a:r>
+            <a:r>
+              <a:rPr lang="en-GB" sz="4800" dirty="0"/>
+              <a:t>unlimited</a:t>
+            </a:r>
+            <a:r>
+              <a:rPr lang="en-GB" sz="4000" dirty="0"/>
+              <a:t> variety of level themes.</a:t>
+            </a:r>
           </a:p>
         </p:txBody>
       </p:sp>
       <p:pic>
         <p:nvPicPr>
-          <p:cNvPr id="4" name="Picture 3"/>
+          <p:cNvPr id="6" name="Picture 5"/>
           <p:cNvPicPr>
             <a:picLocks noChangeAspect="1"/>
           </p:cNvPicPr>
@@ -6328,7 +6285,7 @@
         </p:blipFill>
         <p:spPr>
           <a:xfrm>
-            <a:off x="7315200" y="1244142"/>
+            <a:off x="7995683" y="1300163"/>
             <a:ext cx="4876800" cy="4876800"/>
           </a:xfrm>
           <a:prstGeom prst="rect">
@@ -6339,7 +6296,7 @@
     </p:spTree>
     <p:extLst>
       <p:ext uri="{BB962C8B-B14F-4D97-AF65-F5344CB8AC3E}">
-        <p14:creationId xmlns:p14="http://schemas.microsoft.com/office/powerpoint/2010/main" val="385603907"/>
+        <p14:creationId xmlns:p14="http://schemas.microsoft.com/office/powerpoint/2010/main" val="3120065655"/>
       </p:ext>
     </p:extLst>
   </p:cSld>
@@ -6376,87 +6333,37 @@
             <p:ph type="title"/>
           </p:nvPr>
         </p:nvSpPr>
-        <p:spPr/>
-        <p:txBody>
-          <a:bodyPr/>
-          <a:lstStyle/>
-          <a:p>
-            <a:r>
-              <a:rPr lang="en-GB" dirty="0"/>
-              <a:t>Aesthetics</a:t>
-            </a:r>
-          </a:p>
-        </p:txBody>
-      </p:sp>
-      <p:sp>
-        <p:nvSpPr>
-          <p:cNvPr id="3" name="Content Placeholder 2"/>
-          <p:cNvSpPr>
-            <a:spLocks noGrp="1"/>
-          </p:cNvSpPr>
-          <p:nvPr>
-            <p:ph idx="1"/>
-          </p:nvPr>
-        </p:nvSpPr>
-        <p:spPr>
-          <a:xfrm>
-            <a:off x="1120000" y="1825625"/>
-            <a:ext cx="7726288" cy="4351338"/>
+        <p:spPr>
+          <a:xfrm rot="21199489">
+            <a:off x="919650" y="601306"/>
+            <a:ext cx="10515600" cy="2909907"/>
           </a:xfrm>
         </p:spPr>
         <p:txBody>
           <a:bodyPr>
-            <a:normAutofit lnSpcReduction="10000"/>
+            <a:normAutofit/>
           </a:bodyPr>
           <a:lstStyle/>
           <a:p>
             <a:r>
-              <a:rPr lang="en-GB" dirty="0"/>
-              <a:t>Pixel art, sprite keyframe animation.</a:t>
-            </a:r>
-          </a:p>
-          <a:p>
-            <a:r>
-              <a:rPr lang="en-GB" dirty="0"/>
-              <a:t>Tiled maps.</a:t>
-            </a:r>
-          </a:p>
-          <a:p>
-            <a:r>
-              <a:rPr lang="en-GB" dirty="0"/>
-              <a:t>2.5 dimension view. Top Down with some artificial depth.</a:t>
-            </a:r>
-          </a:p>
-          <a:p>
-            <a:r>
-              <a:rPr lang="en-GB" dirty="0"/>
-              <a:t>A nonchalant, relaxed, and unflinching manner as if ‘out for a stroll’.</a:t>
-            </a:r>
-          </a:p>
-          <a:p>
-            <a:r>
-              <a:rPr lang="en-GB" dirty="0"/>
-              <a:t>Items and weapons are stored inside his suit.</a:t>
-            </a:r>
-          </a:p>
-          <a:p>
-            <a:r>
-              <a:rPr lang="en-GB" dirty="0"/>
-              <a:t>He never runs, crouches, or looks to exert himself.</a:t>
-            </a:r>
-          </a:p>
-          <a:p>
-            <a:r>
-              <a:rPr lang="en-GB" dirty="0"/>
-              <a:t>However once armed there is a formidable professionalism in his stance and movement.</a:t>
-            </a:r>
-            <a:endParaRPr lang="en-GB" dirty="0"/>
+              <a:rPr lang="en-GB" sz="8800" dirty="0"/>
+              <a:t>Simple</a:t>
+            </a:r>
+            <a:r>
+              <a:rPr lang="en-GB" sz="8000" dirty="0"/>
+              <a:t> </a:t>
+            </a:r>
+            <a:r>
+              <a:rPr lang="en-GB" sz="7200" dirty="0"/>
+              <a:t>controls!</a:t>
+            </a:r>
+            <a:endParaRPr lang="en-GB" sz="8000" dirty="0"/>
           </a:p>
         </p:txBody>
       </p:sp>
       <p:pic>
         <p:nvPicPr>
-          <p:cNvPr id="6" name="Picture 5"/>
+          <p:cNvPr id="4" name="Picture 3"/>
           <p:cNvPicPr>
             <a:picLocks noChangeAspect="1"/>
           </p:cNvPicPr>
@@ -6470,7 +6377,7 @@
         </p:blipFill>
         <p:spPr>
           <a:xfrm>
-            <a:off x="7388413" y="1300163"/>
+            <a:off x="7315200" y="1244142"/>
             <a:ext cx="4876800" cy="4876800"/>
           </a:xfrm>
           <a:prstGeom prst="rect">
@@ -6481,7 +6388,7 @@
     </p:spTree>
     <p:extLst>
       <p:ext uri="{BB962C8B-B14F-4D97-AF65-F5344CB8AC3E}">
-        <p14:creationId xmlns:p14="http://schemas.microsoft.com/office/powerpoint/2010/main" val="1460784710"/>
+        <p14:creationId xmlns:p14="http://schemas.microsoft.com/office/powerpoint/2010/main" val="385603907"/>
       </p:ext>
     </p:extLst>
   </p:cSld>
@@ -6518,69 +6425,28 @@
             <p:ph type="title"/>
           </p:nvPr>
         </p:nvSpPr>
-        <p:spPr/>
-        <p:txBody>
-          <a:bodyPr/>
-          <a:lstStyle/>
-          <a:p>
-            <a:r>
-              <a:rPr lang="en-GB" dirty="0"/>
-              <a:t>Audio</a:t>
-            </a:r>
-          </a:p>
-        </p:txBody>
-      </p:sp>
-      <p:sp>
-        <p:nvSpPr>
-          <p:cNvPr id="3" name="Content Placeholder 2"/>
-          <p:cNvSpPr>
-            <a:spLocks noGrp="1"/>
-          </p:cNvSpPr>
-          <p:nvPr>
-            <p:ph idx="1"/>
-          </p:nvPr>
-        </p:nvSpPr>
-        <p:spPr>
-          <a:xfrm>
-            <a:off x="1120000" y="1825625"/>
-            <a:ext cx="8066530" cy="4351338"/>
-          </a:xfrm>
-        </p:spPr>
-        <p:txBody>
-          <a:bodyPr/>
-          <a:lstStyle/>
-          <a:p>
-            <a:r>
-              <a:rPr lang="en-GB" dirty="0"/>
-              <a:t>Keeping with the pixel art style of visuals, chiptune music and sound effects.</a:t>
-            </a:r>
-          </a:p>
-          <a:p>
-            <a:r>
-              <a:rPr lang="en-GB" dirty="0"/>
-              <a:t>Emphasis on atmosphere, Era specific background noises. Water dripping in caves etc.</a:t>
-            </a:r>
-          </a:p>
-          <a:p>
-            <a:r>
-              <a:rPr lang="en-GB" dirty="0"/>
-              <a:t>Tension building sneak music.</a:t>
-            </a:r>
-          </a:p>
-          <a:p>
-            <a:r>
-              <a:rPr lang="en-GB" dirty="0"/>
-              <a:t>More intense battle music.</a:t>
-            </a:r>
-          </a:p>
-          <a:p>
-            <a:endParaRPr lang="en-GB" dirty="0"/>
+        <p:spPr>
+          <a:xfrm rot="21239022">
+            <a:off x="1499191" y="492717"/>
+            <a:ext cx="10779642" cy="2994763"/>
+          </a:xfrm>
+        </p:spPr>
+        <p:txBody>
+          <a:bodyPr>
+            <a:normAutofit/>
+          </a:bodyPr>
+          <a:lstStyle/>
+          <a:p>
+            <a:r>
+              <a:rPr lang="en-GB" sz="8800" dirty="0"/>
+              <a:t>Pixel Art?</a:t>
+            </a:r>
           </a:p>
         </p:txBody>
       </p:sp>
       <p:pic>
         <p:nvPicPr>
-          <p:cNvPr id="4" name="Picture 3"/>
+          <p:cNvPr id="6" name="Picture 5"/>
           <p:cNvPicPr>
             <a:picLocks noChangeAspect="1"/>
           </p:cNvPicPr>
@@ -6594,31 +6460,7 @@
         </p:blipFill>
         <p:spPr>
           <a:xfrm>
-            <a:off x="-7070651" y="1469066"/>
-            <a:ext cx="9565758" cy="9565758"/>
-          </a:xfrm>
-          <a:prstGeom prst="rect">
-            <a:avLst/>
-          </a:prstGeom>
-        </p:spPr>
-      </p:pic>
-      <p:pic>
-        <p:nvPicPr>
-          <p:cNvPr id="5" name="Picture 4"/>
-          <p:cNvPicPr>
-            <a:picLocks noChangeAspect="1"/>
-          </p:cNvPicPr>
-          <p:nvPr/>
-        </p:nvPicPr>
-        <p:blipFill>
-          <a:blip r:embed="rId3"/>
-          <a:stretch>
-            <a:fillRect/>
-          </a:stretch>
-        </p:blipFill>
-        <p:spPr>
-          <a:xfrm>
-            <a:off x="7857460" y="1187394"/>
+            <a:off x="7388413" y="1300163"/>
             <a:ext cx="4876800" cy="4876800"/>
           </a:xfrm>
           <a:prstGeom prst="rect">
@@ -6629,7 +6471,7 @@
     </p:spTree>
     <p:extLst>
       <p:ext uri="{BB962C8B-B14F-4D97-AF65-F5344CB8AC3E}">
-        <p14:creationId xmlns:p14="http://schemas.microsoft.com/office/powerpoint/2010/main" val="1291827028"/>
+        <p14:creationId xmlns:p14="http://schemas.microsoft.com/office/powerpoint/2010/main" val="1460784710"/>
       </p:ext>
     </p:extLst>
   </p:cSld>
@@ -6678,69 +6520,9 @@
           </a:p>
         </p:txBody>
       </p:sp>
-      <p:sp>
-        <p:nvSpPr>
-          <p:cNvPr id="3" name="Content Placeholder 2"/>
-          <p:cNvSpPr>
-            <a:spLocks noGrp="1"/>
-          </p:cNvSpPr>
-          <p:nvPr>
-            <p:ph idx="1"/>
-          </p:nvPr>
-        </p:nvSpPr>
-        <p:spPr>
-          <a:xfrm>
-            <a:off x="5932967" y="1846890"/>
-            <a:ext cx="5622851" cy="4351338"/>
-          </a:xfrm>
-        </p:spPr>
-        <p:txBody>
-          <a:bodyPr/>
-          <a:lstStyle/>
-          <a:p>
-            <a:r>
-              <a:rPr lang="en-GB" dirty="0"/>
-              <a:t>Pixel art popular?</a:t>
-            </a:r>
-          </a:p>
-          <a:p>
-            <a:r>
-              <a:rPr lang="en-GB" dirty="0" err="1"/>
-              <a:t>Boxhead</a:t>
-            </a:r>
-            <a:endParaRPr lang="en-GB" dirty="0"/>
-          </a:p>
-          <a:p>
-            <a:r>
-              <a:rPr lang="en-GB" dirty="0"/>
-              <a:t>Hyper light drifter</a:t>
-            </a:r>
-          </a:p>
-          <a:p>
-            <a:r>
-              <a:rPr lang="en-GB" dirty="0"/>
-              <a:t>Reminiscent of older games such as </a:t>
-            </a:r>
-            <a:r>
-              <a:rPr lang="en-GB" dirty="0" err="1"/>
-              <a:t>pokemon</a:t>
-            </a:r>
-            <a:r>
-              <a:rPr lang="en-GB" dirty="0"/>
-              <a:t> </a:t>
-            </a:r>
-          </a:p>
-          <a:p>
-            <a:r>
-              <a:rPr lang="en-GB" dirty="0"/>
-              <a:t>Will target those </a:t>
-            </a:r>
-          </a:p>
-        </p:txBody>
-      </p:sp>
       <p:pic>
         <p:nvPicPr>
-          <p:cNvPr id="5" name="Picture 4"/>
+          <p:cNvPr id="4" name="Picture 3"/>
           <p:cNvPicPr>
             <a:picLocks noChangeAspect="1"/>
           </p:cNvPicPr>
@@ -6754,8 +6536,32 @@
         </p:blipFill>
         <p:spPr>
           <a:xfrm>
-            <a:off x="170121" y="1412359"/>
-            <a:ext cx="5560828" cy="5560828"/>
+            <a:off x="-7070651" y="1469066"/>
+            <a:ext cx="9565758" cy="9565758"/>
+          </a:xfrm>
+          <a:prstGeom prst="rect">
+            <a:avLst/>
+          </a:prstGeom>
+        </p:spPr>
+      </p:pic>
+      <p:pic>
+        <p:nvPicPr>
+          <p:cNvPr id="5" name="Picture 4"/>
+          <p:cNvPicPr>
+            <a:picLocks noChangeAspect="1"/>
+          </p:cNvPicPr>
+          <p:nvPr/>
+        </p:nvPicPr>
+        <p:blipFill>
+          <a:blip r:embed="rId3"/>
+          <a:stretch>
+            <a:fillRect/>
+          </a:stretch>
+        </p:blipFill>
+        <p:spPr>
+          <a:xfrm>
+            <a:off x="7857460" y="1187394"/>
+            <a:ext cx="4876800" cy="4876800"/>
           </a:xfrm>
           <a:prstGeom prst="rect">
             <a:avLst/>
@@ -6765,7 +6571,7 @@
     </p:spTree>
     <p:extLst>
       <p:ext uri="{BB962C8B-B14F-4D97-AF65-F5344CB8AC3E}">
-        <p14:creationId xmlns:p14="http://schemas.microsoft.com/office/powerpoint/2010/main" val="3194383160"/>
+        <p14:creationId xmlns:p14="http://schemas.microsoft.com/office/powerpoint/2010/main" val="1291827028"/>
       </p:ext>
     </p:extLst>
   </p:cSld>
@@ -6809,20 +6615,18 @@
           <a:p>
             <a:r>
               <a:rPr lang="en-GB" dirty="0"/>
-              <a:t>Live demonstration</a:t>
+              <a:t>Marketing</a:t>
             </a:r>
           </a:p>
         </p:txBody>
       </p:sp>
       <p:pic>
         <p:nvPicPr>
-          <p:cNvPr id="4" name="Content Placeholder 3"/>
+          <p:cNvPr id="5" name="Picture 4"/>
           <p:cNvPicPr>
-            <a:picLocks noGrp="1" noChangeAspect="1"/>
+            <a:picLocks noChangeAspect="1"/>
           </p:cNvPicPr>
-          <p:nvPr>
-            <p:ph idx="1"/>
-          </p:nvPr>
+          <p:nvPr/>
         </p:nvPicPr>
         <p:blipFill>
           <a:blip r:embed="rId2"/>
@@ -6832,15 +6636,18 @@
         </p:blipFill>
         <p:spPr>
           <a:xfrm>
-            <a:off x="5249881" y="890532"/>
-            <a:ext cx="5967468" cy="5967468"/>
-          </a:xfrm>
+            <a:off x="170121" y="1412359"/>
+            <a:ext cx="5560828" cy="5560828"/>
+          </a:xfrm>
+          <a:prstGeom prst="rect">
+            <a:avLst/>
+          </a:prstGeom>
         </p:spPr>
       </p:pic>
     </p:spTree>
     <p:extLst>
       <p:ext uri="{BB962C8B-B14F-4D97-AF65-F5344CB8AC3E}">
-        <p14:creationId xmlns:p14="http://schemas.microsoft.com/office/powerpoint/2010/main" val="3674195138"/>
+        <p14:creationId xmlns:p14="http://schemas.microsoft.com/office/powerpoint/2010/main" val="3194383160"/>
       </p:ext>
     </p:extLst>
   </p:cSld>

</xml_diff>

<commit_message>
Holy Shit is it finished???!!!
</commit_message>
<xml_diff>
--- a/Game Pitch/The Curator.pptx
+++ b/Game Pitch/The Curator.pptx
@@ -6508,15 +6508,35 @@
             <p:ph type="title"/>
           </p:nvPr>
         </p:nvSpPr>
-        <p:spPr/>
-        <p:txBody>
-          <a:bodyPr/>
-          <a:lstStyle/>
-          <a:p>
-            <a:r>
-              <a:rPr lang="en-GB" dirty="0"/>
-              <a:t>Marketing</a:t>
-            </a:r>
+        <p:spPr>
+          <a:xfrm rot="21070882">
+            <a:off x="1403178" y="1019804"/>
+            <a:ext cx="6328144" cy="2133526"/>
+          </a:xfrm>
+        </p:spPr>
+        <p:txBody>
+          <a:bodyPr>
+            <a:normAutofit/>
+          </a:bodyPr>
+          <a:lstStyle/>
+          <a:p>
+            <a:r>
+              <a:rPr lang="en-GB" sz="8000" dirty="0"/>
+              <a:t>Who</a:t>
+            </a:r>
+            <a:r>
+              <a:rPr lang="en-GB" sz="6000" dirty="0"/>
+              <a:t> is it </a:t>
+            </a:r>
+            <a:r>
+              <a:rPr lang="en-GB" sz="7200" dirty="0"/>
+              <a:t>for</a:t>
+            </a:r>
+            <a:r>
+              <a:rPr lang="en-GB" sz="8000" dirty="0"/>
+              <a:t>?</a:t>
+            </a:r>
+            <a:endParaRPr lang="en-GB" sz="6000" dirty="0"/>
           </a:p>
         </p:txBody>
       </p:sp>
@@ -6598,28 +6618,6 @@
           <a:chExt cx="0" cy="0"/>
         </a:xfrm>
       </p:grpSpPr>
-      <p:sp>
-        <p:nvSpPr>
-          <p:cNvPr id="2" name="Title 1"/>
-          <p:cNvSpPr>
-            <a:spLocks noGrp="1"/>
-          </p:cNvSpPr>
-          <p:nvPr>
-            <p:ph type="title"/>
-          </p:nvPr>
-        </p:nvSpPr>
-        <p:spPr/>
-        <p:txBody>
-          <a:bodyPr/>
-          <a:lstStyle/>
-          <a:p>
-            <a:r>
-              <a:rPr lang="en-GB" dirty="0"/>
-              <a:t>Marketing</a:t>
-            </a:r>
-          </a:p>
-        </p:txBody>
-      </p:sp>
       <p:pic>
         <p:nvPicPr>
           <p:cNvPr id="5" name="Picture 4"/>
@@ -6636,12 +6634,292 @@
         </p:blipFill>
         <p:spPr>
           <a:xfrm>
-            <a:off x="170121" y="1412359"/>
+            <a:off x="191386" y="1795131"/>
             <a:ext cx="5560828" cy="5560828"/>
           </a:xfrm>
           <a:prstGeom prst="rect">
             <a:avLst/>
           </a:prstGeom>
+        </p:spPr>
+      </p:pic>
+      <p:pic>
+        <p:nvPicPr>
+          <p:cNvPr id="1026" name="Picture 2" descr="https://images.discordapp.net/.eJwNx0sKwyAQANC7uI-f0akmdygUcgARIxpIVHS6Kr17-3bvw97jYhsrRH1uQhznjG0cfFIbISeeW8tXCv2cPLZbBKIQy50qTQEaDeKqjEIFxjoLAhC1htVpdM46kE6JPY6Uqt9LIw9SPRYFi0Qf_uNScmn868l7zez7A1wvKl4.bKZ-9qWSCqwxBQdCjc0VJ_5OuAA?width=178&amp;height=299"/>
+          <p:cNvPicPr>
+            <a:picLocks noChangeAspect="1" noChangeArrowheads="1"/>
+          </p:cNvPicPr>
+          <p:nvPr/>
+        </p:nvPicPr>
+        <p:blipFill>
+          <a:blip r:embed="rId3">
+            <a:extLst>
+              <a:ext uri="{28A0092B-C50C-407E-A947-70E740481C1C}">
+                <a14:useLocalDpi xmlns:a14="http://schemas.microsoft.com/office/drawing/2010/main" val="0"/>
+              </a:ext>
+            </a:extLst>
+          </a:blip>
+          <a:srcRect/>
+          <a:stretch>
+            <a:fillRect/>
+          </a:stretch>
+        </p:blipFill>
+        <p:spPr bwMode="auto">
+          <a:xfrm>
+            <a:off x="310006" y="366381"/>
+            <a:ext cx="1704975" cy="2857500"/>
+          </a:xfrm>
+          <a:prstGeom prst="rect">
+            <a:avLst/>
+          </a:prstGeom>
+          <a:noFill/>
+          <a:extLst>
+            <a:ext uri="{909E8E84-426E-40DD-AFC4-6F175D3DCCD1}">
+              <a14:hiddenFill xmlns:a14="http://schemas.microsoft.com/office/drawing/2010/main">
+                <a:solidFill>
+                  <a:srgbClr val="FFFFFF"/>
+                </a:solidFill>
+              </a14:hiddenFill>
+            </a:ext>
+          </a:extLst>
+        </p:spPr>
+      </p:pic>
+      <p:pic>
+        <p:nvPicPr>
+          <p:cNvPr id="1028" name="Picture 4" descr="https://images.discordapp.net/.eJwNx0EOgyAQAMC_cBfYlQXxDyZNfAAhSNBExcD21PTv7dzmI97tFLPYmZ8-K7UdPdW2yc61xZJlqbWcOT5Hl6leKjLHtF_55q5wJEPkwQABGjc5VEg0jui9J-eMnTxOak0t5zuse-WAGuwAOGgK8T-pQYINr0U-dxHfH19VKnI.z8zELZdhowkhpP5NtKfv_Gns8Vk?width=174&amp;height=300"/>
+          <p:cNvPicPr>
+            <a:picLocks noChangeAspect="1" noChangeArrowheads="1"/>
+          </p:cNvPicPr>
+          <p:nvPr/>
+        </p:nvPicPr>
+        <p:blipFill>
+          <a:blip r:embed="rId4">
+            <a:extLst>
+              <a:ext uri="{28A0092B-C50C-407E-A947-70E740481C1C}">
+                <a14:useLocalDpi xmlns:a14="http://schemas.microsoft.com/office/drawing/2010/main" val="0"/>
+              </a:ext>
+            </a:extLst>
+          </a:blip>
+          <a:srcRect/>
+          <a:stretch>
+            <a:fillRect/>
+          </a:stretch>
+        </p:blipFill>
+        <p:spPr bwMode="auto">
+          <a:xfrm>
+            <a:off x="2375269" y="366381"/>
+            <a:ext cx="1657350" cy="2857500"/>
+          </a:xfrm>
+          <a:prstGeom prst="rect">
+            <a:avLst/>
+          </a:prstGeom>
+          <a:noFill/>
+          <a:extLst>
+            <a:ext uri="{909E8E84-426E-40DD-AFC4-6F175D3DCCD1}">
+              <a14:hiddenFill xmlns:a14="http://schemas.microsoft.com/office/drawing/2010/main">
+                <a:solidFill>
+                  <a:srgbClr val="FFFFFF"/>
+                </a:solidFill>
+              </a14:hiddenFill>
+            </a:ext>
+          </a:extLst>
+        </p:spPr>
+      </p:pic>
+      <p:pic>
+        <p:nvPicPr>
+          <p:cNvPr id="1030" name="Picture 6" descr="https://images.discordapp.net/.eJwNx0EKwyAQAMC_eI-uq1tr_hAo5AEiRjSQxKDbU-nf27nNR7z7IWZRme8xK7XtI7W-ycGtx5Jlaa0cOd77kKmdKjLHVM988VBoyBJ5bTVptO7pUCGRMQbAeweeLFpQa-o5X2GtjQOCfkwaJ6AQ_5MAkii8FnlfRXx_WQAqUw.7qJYaRMvbBRIXi0JnYoaqHzleG4?width=173&amp;height=300"/>
+          <p:cNvPicPr>
+            <a:picLocks noChangeAspect="1" noChangeArrowheads="1"/>
+          </p:cNvPicPr>
+          <p:nvPr/>
+        </p:nvPicPr>
+        <p:blipFill>
+          <a:blip r:embed="rId5">
+            <a:extLst>
+              <a:ext uri="{28A0092B-C50C-407E-A947-70E740481C1C}">
+                <a14:useLocalDpi xmlns:a14="http://schemas.microsoft.com/office/drawing/2010/main" val="0"/>
+              </a:ext>
+            </a:extLst>
+          </a:blip>
+          <a:srcRect/>
+          <a:stretch>
+            <a:fillRect/>
+          </a:stretch>
+        </p:blipFill>
+        <p:spPr bwMode="auto">
+          <a:xfrm>
+            <a:off x="4423254" y="366381"/>
+            <a:ext cx="1657350" cy="2857500"/>
+          </a:xfrm>
+          <a:prstGeom prst="rect">
+            <a:avLst/>
+          </a:prstGeom>
+          <a:noFill/>
+          <a:extLst>
+            <a:ext uri="{909E8E84-426E-40DD-AFC4-6F175D3DCCD1}">
+              <a14:hiddenFill xmlns:a14="http://schemas.microsoft.com/office/drawing/2010/main">
+                <a:solidFill>
+                  <a:srgbClr val="FFFFFF"/>
+                </a:solidFill>
+              </a14:hiddenFill>
+            </a:ext>
+          </a:extLst>
+        </p:spPr>
+      </p:pic>
+      <p:sp>
+        <p:nvSpPr>
+          <p:cNvPr id="10" name="Title 1"/>
+          <p:cNvSpPr>
+            <a:spLocks noGrp="1"/>
+          </p:cNvSpPr>
+          <p:nvPr>
+            <p:ph type="title"/>
+          </p:nvPr>
+        </p:nvSpPr>
+        <p:spPr>
+          <a:xfrm>
+            <a:off x="6080604" y="6220046"/>
+            <a:ext cx="6021018" cy="435935"/>
+          </a:xfrm>
+        </p:spPr>
+        <p:txBody>
+          <a:bodyPr>
+            <a:noAutofit/>
+          </a:bodyPr>
+          <a:lstStyle/>
+          <a:p>
+            <a:r>
+              <a:rPr lang="en-GB" sz="2000" dirty="0"/>
+              <a:t>Figures and images courtesy of Steam and </a:t>
+            </a:r>
+            <a:r>
+              <a:rPr lang="en-GB" sz="2000" dirty="0" err="1"/>
+              <a:t>Steamspy</a:t>
+            </a:r>
+            <a:endParaRPr lang="en-GB" sz="2000" dirty="0"/>
+          </a:p>
+        </p:txBody>
+      </p:sp>
+      <p:pic>
+        <p:nvPicPr>
+          <p:cNvPr id="1032" name="Picture 8" descr="https://images.discordapp.net/.eJwNx0EOgyAQAMC_cBfYhVXxDyZNfAAhSMBExcD21PTv7dzmI97tFIsozE9flNqPHmvbZefaQk4y15rPFJ6jy1gvFZhDLFe6uSs0ZIkcWCBAO80TKiQyxpC2NBqcwSGoLbaUbr-Vyh41jAPgoMmH_6Q2kpx_rfK5s_j-AFisKlc.BaSURPhs-I1uHZsvCJl8CBYuzFs?width=194&amp;height=300"/>
+          <p:cNvPicPr>
+            <a:picLocks noChangeAspect="1" noChangeArrowheads="1"/>
+          </p:cNvPicPr>
+          <p:nvPr/>
+        </p:nvPicPr>
+        <p:blipFill>
+          <a:blip r:embed="rId6">
+            <a:extLst>
+              <a:ext uri="{28A0092B-C50C-407E-A947-70E740481C1C}">
+                <a14:useLocalDpi xmlns:a14="http://schemas.microsoft.com/office/drawing/2010/main" val="0"/>
+              </a:ext>
+            </a:extLst>
+          </a:blip>
+          <a:srcRect/>
+          <a:stretch>
+            <a:fillRect/>
+          </a:stretch>
+        </p:blipFill>
+        <p:spPr bwMode="auto">
+          <a:xfrm>
+            <a:off x="6471239" y="366381"/>
+            <a:ext cx="1847850" cy="2857500"/>
+          </a:xfrm>
+          <a:prstGeom prst="rect">
+            <a:avLst/>
+          </a:prstGeom>
+          <a:noFill/>
+          <a:extLst>
+            <a:ext uri="{909E8E84-426E-40DD-AFC4-6F175D3DCCD1}">
+              <a14:hiddenFill xmlns:a14="http://schemas.microsoft.com/office/drawing/2010/main">
+                <a:solidFill>
+                  <a:srgbClr val="FFFFFF"/>
+                </a:solidFill>
+              </a14:hiddenFill>
+            </a:ext>
+          </a:extLst>
+        </p:spPr>
+      </p:pic>
+      <p:pic>
+        <p:nvPicPr>
+          <p:cNvPr id="1034" name="Picture 10" descr="https://images.discordapp.net/.eJwNx0sKwyAQANC7uI-f0dEmdwgUcgARIxpINOh0VXr35u3el336yRZWiO6xCLEfI7a-80Gth5x4bi2fKdzH4LFdIhCFWK5UaQjQaBBnZRQqMO7lQACi1np2z8Eahwhiiz2l6rfSyINUdlIwSfThGZfIjfXvld81s98fWjkqXQ.QRl0AtXUREpAqblfh7ijm-mvu9Q?width=242&amp;height=300"/>
+          <p:cNvPicPr>
+            <a:picLocks noChangeAspect="1" noChangeArrowheads="1"/>
+          </p:cNvPicPr>
+          <p:nvPr/>
+        </p:nvPicPr>
+        <p:blipFill>
+          <a:blip r:embed="rId7">
+            <a:extLst>
+              <a:ext uri="{28A0092B-C50C-407E-A947-70E740481C1C}">
+                <a14:useLocalDpi xmlns:a14="http://schemas.microsoft.com/office/drawing/2010/main" val="0"/>
+              </a:ext>
+            </a:extLst>
+          </a:blip>
+          <a:srcRect/>
+          <a:stretch>
+            <a:fillRect/>
+          </a:stretch>
+        </p:blipFill>
+        <p:spPr bwMode="auto">
+          <a:xfrm>
+            <a:off x="8628210" y="366381"/>
+            <a:ext cx="2314575" cy="2857500"/>
+          </a:xfrm>
+          <a:prstGeom prst="rect">
+            <a:avLst/>
+          </a:prstGeom>
+          <a:noFill/>
+          <a:extLst>
+            <a:ext uri="{909E8E84-426E-40DD-AFC4-6F175D3DCCD1}">
+              <a14:hiddenFill xmlns:a14="http://schemas.microsoft.com/office/drawing/2010/main">
+                <a:solidFill>
+                  <a:srgbClr val="FFFFFF"/>
+                </a:solidFill>
+              </a14:hiddenFill>
+            </a:ext>
+          </a:extLst>
+        </p:spPr>
+      </p:pic>
+      <p:pic>
+        <p:nvPicPr>
+          <p:cNvPr id="1038" name="Picture 14" descr="https://images.discordapp.net/.eJwNyEEKwyAQAMC_eI-66hqbPwQKeYCIEQ0kGnR7Kv17c5z5sk8_2cIK0T0WIfZjxNZ3Pqj1kBPPreUzhfsYPLZLBKIQy5UqDaE0GsQXGEBQZnazEgpRawRrHDwNxlqxxZ5S9Vtp5JUEO4GaJPrwiIPk4Px75XfN7PcHWCoqTw.MgD0hw6FR45Br6Px6A-N4OHy00w?width=400&amp;height=256"/>
+          <p:cNvPicPr>
+            <a:picLocks noChangeAspect="1" noChangeArrowheads="1"/>
+          </p:cNvPicPr>
+          <p:nvPr/>
+        </p:nvPicPr>
+        <p:blipFill>
+          <a:blip r:embed="rId8">
+            <a:extLst>
+              <a:ext uri="{28A0092B-C50C-407E-A947-70E740481C1C}">
+                <a14:useLocalDpi xmlns:a14="http://schemas.microsoft.com/office/drawing/2010/main" val="0"/>
+              </a:ext>
+            </a:extLst>
+          </a:blip>
+          <a:srcRect/>
+          <a:stretch>
+            <a:fillRect/>
+          </a:stretch>
+        </p:blipFill>
+        <p:spPr bwMode="auto">
+          <a:xfrm>
+            <a:off x="7132785" y="3502763"/>
+            <a:ext cx="3810000" cy="2438400"/>
+          </a:xfrm>
+          <a:prstGeom prst="rect">
+            <a:avLst/>
+          </a:prstGeom>
+          <a:noFill/>
+          <a:extLst>
+            <a:ext uri="{909E8E84-426E-40DD-AFC4-6F175D3DCCD1}">
+              <a14:hiddenFill xmlns:a14="http://schemas.microsoft.com/office/drawing/2010/main">
+                <a:solidFill>
+                  <a:srgbClr val="FFFFFF"/>
+                </a:solidFill>
+              </a14:hiddenFill>
+            </a:ext>
+          </a:extLst>
         </p:spPr>
       </p:pic>
     </p:spTree>

</xml_diff>

<commit_message>
No but this might be...
</commit_message>
<xml_diff>
--- a/Game Pitch/The Curator.pptx
+++ b/Game Pitch/The Curator.pptx
@@ -12,10 +12,11 @@
     <p:sldId id="259" r:id="rId6"/>
     <p:sldId id="260" r:id="rId7"/>
     <p:sldId id="261" r:id="rId8"/>
-    <p:sldId id="262" r:id="rId9"/>
-    <p:sldId id="263" r:id="rId10"/>
-    <p:sldId id="264" r:id="rId11"/>
-    <p:sldId id="265" r:id="rId12"/>
+    <p:sldId id="267" r:id="rId9"/>
+    <p:sldId id="262" r:id="rId10"/>
+    <p:sldId id="263" r:id="rId11"/>
+    <p:sldId id="264" r:id="rId12"/>
+    <p:sldId id="265" r:id="rId13"/>
   </p:sldIdLst>
   <p:sldSz cx="12192000" cy="6858000"/>
   <p:notesSz cx="6858000" cy="9144000"/>
@@ -5785,6 +5786,340 @@
           <a:chExt cx="0" cy="0"/>
         </a:xfrm>
       </p:grpSpPr>
+      <p:pic>
+        <p:nvPicPr>
+          <p:cNvPr id="5" name="Picture 4"/>
+          <p:cNvPicPr>
+            <a:picLocks noChangeAspect="1"/>
+          </p:cNvPicPr>
+          <p:nvPr/>
+        </p:nvPicPr>
+        <p:blipFill>
+          <a:blip r:embed="rId2"/>
+          <a:stretch>
+            <a:fillRect/>
+          </a:stretch>
+        </p:blipFill>
+        <p:spPr>
+          <a:xfrm>
+            <a:off x="191386" y="1795131"/>
+            <a:ext cx="5560828" cy="5560828"/>
+          </a:xfrm>
+          <a:prstGeom prst="rect">
+            <a:avLst/>
+          </a:prstGeom>
+        </p:spPr>
+      </p:pic>
+      <p:pic>
+        <p:nvPicPr>
+          <p:cNvPr id="1026" name="Picture 2" descr="https://images.discordapp.net/.eJwNx0sKwyAQANC7uI-f0akmdygUcgARIxpIVHS6Kr17-3bvw97jYhsrRH1uQhznjG0cfFIbISeeW8tXCv2cPLZbBKIQy50qTQEaDeKqjEIFxjoLAhC1htVpdM46kE6JPY6Uqt9LIw9SPRYFi0Qf_uNScmn868l7zez7A1wvKl4.bKZ-9qWSCqwxBQdCjc0VJ_5OuAA?width=178&amp;height=299"/>
+          <p:cNvPicPr>
+            <a:picLocks noChangeAspect="1" noChangeArrowheads="1"/>
+          </p:cNvPicPr>
+          <p:nvPr/>
+        </p:nvPicPr>
+        <p:blipFill>
+          <a:blip r:embed="rId3">
+            <a:extLst>
+              <a:ext uri="{28A0092B-C50C-407E-A947-70E740481C1C}">
+                <a14:useLocalDpi xmlns:a14="http://schemas.microsoft.com/office/drawing/2010/main" val="0"/>
+              </a:ext>
+            </a:extLst>
+          </a:blip>
+          <a:srcRect/>
+          <a:stretch>
+            <a:fillRect/>
+          </a:stretch>
+        </p:blipFill>
+        <p:spPr bwMode="auto">
+          <a:xfrm>
+            <a:off x="310006" y="366381"/>
+            <a:ext cx="1704975" cy="2857500"/>
+          </a:xfrm>
+          <a:prstGeom prst="rect">
+            <a:avLst/>
+          </a:prstGeom>
+          <a:noFill/>
+          <a:extLst>
+            <a:ext uri="{909E8E84-426E-40DD-AFC4-6F175D3DCCD1}">
+              <a14:hiddenFill xmlns:a14="http://schemas.microsoft.com/office/drawing/2010/main">
+                <a:solidFill>
+                  <a:srgbClr val="FFFFFF"/>
+                </a:solidFill>
+              </a14:hiddenFill>
+            </a:ext>
+          </a:extLst>
+        </p:spPr>
+      </p:pic>
+      <p:pic>
+        <p:nvPicPr>
+          <p:cNvPr id="1028" name="Picture 4" descr="https://images.discordapp.net/.eJwNx0EOgyAQAMC_cBfYlQXxDyZNfAAhSNBExcD21PTv7dzmI97tFLPYmZ8-K7UdPdW2yc61xZJlqbWcOT5Hl6leKjLHtF_55q5wJEPkwQABGjc5VEg0jui9J-eMnTxOak0t5zuse-WAGuwAOGgK8T-pQYINr0U-dxHfH19VKnI.z8zELZdhowkhpP5NtKfv_Gns8Vk?width=174&amp;height=300"/>
+          <p:cNvPicPr>
+            <a:picLocks noChangeAspect="1" noChangeArrowheads="1"/>
+          </p:cNvPicPr>
+          <p:nvPr/>
+        </p:nvPicPr>
+        <p:blipFill>
+          <a:blip r:embed="rId4">
+            <a:extLst>
+              <a:ext uri="{28A0092B-C50C-407E-A947-70E740481C1C}">
+                <a14:useLocalDpi xmlns:a14="http://schemas.microsoft.com/office/drawing/2010/main" val="0"/>
+              </a:ext>
+            </a:extLst>
+          </a:blip>
+          <a:srcRect/>
+          <a:stretch>
+            <a:fillRect/>
+          </a:stretch>
+        </p:blipFill>
+        <p:spPr bwMode="auto">
+          <a:xfrm>
+            <a:off x="2375269" y="366381"/>
+            <a:ext cx="1657350" cy="2857500"/>
+          </a:xfrm>
+          <a:prstGeom prst="rect">
+            <a:avLst/>
+          </a:prstGeom>
+          <a:noFill/>
+          <a:extLst>
+            <a:ext uri="{909E8E84-426E-40DD-AFC4-6F175D3DCCD1}">
+              <a14:hiddenFill xmlns:a14="http://schemas.microsoft.com/office/drawing/2010/main">
+                <a:solidFill>
+                  <a:srgbClr val="FFFFFF"/>
+                </a:solidFill>
+              </a14:hiddenFill>
+            </a:ext>
+          </a:extLst>
+        </p:spPr>
+      </p:pic>
+      <p:pic>
+        <p:nvPicPr>
+          <p:cNvPr id="1030" name="Picture 6" descr="https://images.discordapp.net/.eJwNx0EKwyAQAMC_eI-uq1tr_hAo5AEiRjSQxKDbU-nf27nNR7z7IWZRme8xK7XtI7W-ycGtx5Jlaa0cOd77kKmdKjLHVM988VBoyBJ5bTVptO7pUCGRMQbAeweeLFpQa-o5X2GtjQOCfkwaJ6AQ_5MAkii8FnlfRXx_WQAqUw.7qJYaRMvbBRIXi0JnYoaqHzleG4?width=173&amp;height=300"/>
+          <p:cNvPicPr>
+            <a:picLocks noChangeAspect="1" noChangeArrowheads="1"/>
+          </p:cNvPicPr>
+          <p:nvPr/>
+        </p:nvPicPr>
+        <p:blipFill>
+          <a:blip r:embed="rId5">
+            <a:extLst>
+              <a:ext uri="{28A0092B-C50C-407E-A947-70E740481C1C}">
+                <a14:useLocalDpi xmlns:a14="http://schemas.microsoft.com/office/drawing/2010/main" val="0"/>
+              </a:ext>
+            </a:extLst>
+          </a:blip>
+          <a:srcRect/>
+          <a:stretch>
+            <a:fillRect/>
+          </a:stretch>
+        </p:blipFill>
+        <p:spPr bwMode="auto">
+          <a:xfrm>
+            <a:off x="4423254" y="366381"/>
+            <a:ext cx="1657350" cy="2857500"/>
+          </a:xfrm>
+          <a:prstGeom prst="rect">
+            <a:avLst/>
+          </a:prstGeom>
+          <a:noFill/>
+          <a:extLst>
+            <a:ext uri="{909E8E84-426E-40DD-AFC4-6F175D3DCCD1}">
+              <a14:hiddenFill xmlns:a14="http://schemas.microsoft.com/office/drawing/2010/main">
+                <a:solidFill>
+                  <a:srgbClr val="FFFFFF"/>
+                </a:solidFill>
+              </a14:hiddenFill>
+            </a:ext>
+          </a:extLst>
+        </p:spPr>
+      </p:pic>
+      <p:sp>
+        <p:nvSpPr>
+          <p:cNvPr id="10" name="Title 1"/>
+          <p:cNvSpPr>
+            <a:spLocks noGrp="1"/>
+          </p:cNvSpPr>
+          <p:nvPr>
+            <p:ph type="title"/>
+          </p:nvPr>
+        </p:nvSpPr>
+        <p:spPr>
+          <a:xfrm>
+            <a:off x="6080604" y="6220046"/>
+            <a:ext cx="6021018" cy="435935"/>
+          </a:xfrm>
+        </p:spPr>
+        <p:txBody>
+          <a:bodyPr>
+            <a:noAutofit/>
+          </a:bodyPr>
+          <a:lstStyle/>
+          <a:p>
+            <a:r>
+              <a:rPr lang="en-GB" sz="2000" dirty="0"/>
+              <a:t>Figures and images courtesy of Steam and </a:t>
+            </a:r>
+            <a:r>
+              <a:rPr lang="en-GB" sz="2000" dirty="0" err="1"/>
+              <a:t>Steamspy</a:t>
+            </a:r>
+            <a:endParaRPr lang="en-GB" sz="2000" dirty="0"/>
+          </a:p>
+        </p:txBody>
+      </p:sp>
+      <p:pic>
+        <p:nvPicPr>
+          <p:cNvPr id="1032" name="Picture 8" descr="https://images.discordapp.net/.eJwNx0EOgyAQAMC_cBfYhVXxDyZNfAAhSMBExcD21PTv7dzmI97tFIsozE9flNqPHmvbZefaQk4y15rPFJ6jy1gvFZhDLFe6uSs0ZIkcWCBAO80TKiQyxpC2NBqcwSGoLbaUbr-Vyh41jAPgoMmH_6Q2kpx_rfK5s_j-AFisKlc.BaSURPhs-I1uHZsvCJl8CBYuzFs?width=194&amp;height=300"/>
+          <p:cNvPicPr>
+            <a:picLocks noChangeAspect="1" noChangeArrowheads="1"/>
+          </p:cNvPicPr>
+          <p:nvPr/>
+        </p:nvPicPr>
+        <p:blipFill>
+          <a:blip r:embed="rId6">
+            <a:extLst>
+              <a:ext uri="{28A0092B-C50C-407E-A947-70E740481C1C}">
+                <a14:useLocalDpi xmlns:a14="http://schemas.microsoft.com/office/drawing/2010/main" val="0"/>
+              </a:ext>
+            </a:extLst>
+          </a:blip>
+          <a:srcRect/>
+          <a:stretch>
+            <a:fillRect/>
+          </a:stretch>
+        </p:blipFill>
+        <p:spPr bwMode="auto">
+          <a:xfrm>
+            <a:off x="6471239" y="366381"/>
+            <a:ext cx="1847850" cy="2857500"/>
+          </a:xfrm>
+          <a:prstGeom prst="rect">
+            <a:avLst/>
+          </a:prstGeom>
+          <a:noFill/>
+          <a:extLst>
+            <a:ext uri="{909E8E84-426E-40DD-AFC4-6F175D3DCCD1}">
+              <a14:hiddenFill xmlns:a14="http://schemas.microsoft.com/office/drawing/2010/main">
+                <a:solidFill>
+                  <a:srgbClr val="FFFFFF"/>
+                </a:solidFill>
+              </a14:hiddenFill>
+            </a:ext>
+          </a:extLst>
+        </p:spPr>
+      </p:pic>
+      <p:pic>
+        <p:nvPicPr>
+          <p:cNvPr id="1034" name="Picture 10" descr="https://images.discordapp.net/.eJwNx0sKwyAQANC7uI-f0dEmdwgUcgARIxpINOh0VXr35u3el336yRZWiO6xCLEfI7a-80Gth5x4bi2fKdzH4LFdIhCFWK5UaQjQaBBnZRQqMO7lQACi1np2z8Eahwhiiz2l6rfSyINUdlIwSfThGZfIjfXvld81s98fWjkqXQ.QRl0AtXUREpAqblfh7ijm-mvu9Q?width=242&amp;height=300"/>
+          <p:cNvPicPr>
+            <a:picLocks noChangeAspect="1" noChangeArrowheads="1"/>
+          </p:cNvPicPr>
+          <p:nvPr/>
+        </p:nvPicPr>
+        <p:blipFill>
+          <a:blip r:embed="rId7">
+            <a:extLst>
+              <a:ext uri="{28A0092B-C50C-407E-A947-70E740481C1C}">
+                <a14:useLocalDpi xmlns:a14="http://schemas.microsoft.com/office/drawing/2010/main" val="0"/>
+              </a:ext>
+            </a:extLst>
+          </a:blip>
+          <a:srcRect/>
+          <a:stretch>
+            <a:fillRect/>
+          </a:stretch>
+        </p:blipFill>
+        <p:spPr bwMode="auto">
+          <a:xfrm>
+            <a:off x="8628210" y="366381"/>
+            <a:ext cx="2314575" cy="2857500"/>
+          </a:xfrm>
+          <a:prstGeom prst="rect">
+            <a:avLst/>
+          </a:prstGeom>
+          <a:noFill/>
+          <a:extLst>
+            <a:ext uri="{909E8E84-426E-40DD-AFC4-6F175D3DCCD1}">
+              <a14:hiddenFill xmlns:a14="http://schemas.microsoft.com/office/drawing/2010/main">
+                <a:solidFill>
+                  <a:srgbClr val="FFFFFF"/>
+                </a:solidFill>
+              </a14:hiddenFill>
+            </a:ext>
+          </a:extLst>
+        </p:spPr>
+      </p:pic>
+      <p:pic>
+        <p:nvPicPr>
+          <p:cNvPr id="1038" name="Picture 14" descr="https://images.discordapp.net/.eJwNyEEKwyAQAMC_eI-66hqbPwQKeYCIEQ0kGnR7Kv17c5z5sk8_2cIK0T0WIfZjxNZ3Pqj1kBPPreUzhfsYPLZLBKIQy5UqDaE0GsQXGEBQZnazEgpRawRrHDwNxlqxxZ5S9Vtp5JUEO4GaJPrwiIPk4Px75XfN7PcHWCoqTw.MgD0hw6FR45Br6Px6A-N4OHy00w?width=400&amp;height=256"/>
+          <p:cNvPicPr>
+            <a:picLocks noChangeAspect="1" noChangeArrowheads="1"/>
+          </p:cNvPicPr>
+          <p:nvPr/>
+        </p:nvPicPr>
+        <p:blipFill>
+          <a:blip r:embed="rId8">
+            <a:extLst>
+              <a:ext uri="{28A0092B-C50C-407E-A947-70E740481C1C}">
+                <a14:useLocalDpi xmlns:a14="http://schemas.microsoft.com/office/drawing/2010/main" val="0"/>
+              </a:ext>
+            </a:extLst>
+          </a:blip>
+          <a:srcRect/>
+          <a:stretch>
+            <a:fillRect/>
+          </a:stretch>
+        </p:blipFill>
+        <p:spPr bwMode="auto">
+          <a:xfrm>
+            <a:off x="7132785" y="3502763"/>
+            <a:ext cx="3810000" cy="2438400"/>
+          </a:xfrm>
+          <a:prstGeom prst="rect">
+            <a:avLst/>
+          </a:prstGeom>
+          <a:noFill/>
+          <a:extLst>
+            <a:ext uri="{909E8E84-426E-40DD-AFC4-6F175D3DCCD1}">
+              <a14:hiddenFill xmlns:a14="http://schemas.microsoft.com/office/drawing/2010/main">
+                <a:solidFill>
+                  <a:srgbClr val="FFFFFF"/>
+                </a:solidFill>
+              </a14:hiddenFill>
+            </a:ext>
+          </a:extLst>
+        </p:spPr>
+      </p:pic>
+    </p:spTree>
+    <p:extLst>
+      <p:ext uri="{BB962C8B-B14F-4D97-AF65-F5344CB8AC3E}">
+        <p14:creationId xmlns:p14="http://schemas.microsoft.com/office/powerpoint/2010/main" val="3194383160"/>
+      </p:ext>
+    </p:extLst>
+  </p:cSld>
+  <p:clrMapOvr>
+    <a:masterClrMapping/>
+  </p:clrMapOvr>
+</p:sld>
+</file>
+
+<file path=ppt/slides/slide11.xml><?xml version="1.0" encoding="utf-8"?>
+<p:sld xmlns:a="http://schemas.openxmlformats.org/drawingml/2006/main" xmlns:r="http://schemas.openxmlformats.org/officeDocument/2006/relationships" xmlns:p="http://schemas.openxmlformats.org/presentationml/2006/main">
+  <p:cSld>
+    <p:spTree>
+      <p:nvGrpSpPr>
+        <p:cNvPr id="1" name=""/>
+        <p:cNvGrpSpPr/>
+        <p:nvPr/>
+      </p:nvGrpSpPr>
+      <p:grpSpPr>
+        <a:xfrm>
+          <a:off x="0" y="0"/>
+          <a:ext cx="0" cy="0"/>
+          <a:chOff x="0" y="0"/>
+          <a:chExt cx="0" cy="0"/>
+        </a:xfrm>
+      </p:grpSpPr>
       <p:sp>
         <p:nvSpPr>
           <p:cNvPr id="2" name="Title 1"/>
@@ -5852,7 +6187,7 @@
 </p:sld>
 </file>
 
-<file path=ppt/slides/slide11.xml><?xml version="1.0" encoding="utf-8"?>
+<file path=ppt/slides/slide12.xml><?xml version="1.0" encoding="utf-8"?>
 <p:sld xmlns:a="http://schemas.openxmlformats.org/drawingml/2006/main" xmlns:r="http://schemas.openxmlformats.org/officeDocument/2006/relationships" xmlns:p="http://schemas.openxmlformats.org/presentationml/2006/main">
   <p:cSld>
     <p:spTree>
@@ -6427,7 +6762,7 @@
         </p:nvSpPr>
         <p:spPr>
           <a:xfrm rot="21239022">
-            <a:off x="1499191" y="492717"/>
+            <a:off x="1520091" y="1203337"/>
             <a:ext cx="10779642" cy="2994763"/>
           </a:xfrm>
         </p:spPr>
@@ -6439,7 +6774,7 @@
           <a:p>
             <a:r>
               <a:rPr lang="en-GB" sz="8800" dirty="0"/>
-              <a:t>Pixel Art?</a:t>
+              <a:t>Pixel Art</a:t>
             </a:r>
           </a:p>
         </p:txBody>
@@ -6509,40 +6844,34 @@
           </p:nvPr>
         </p:nvSpPr>
         <p:spPr>
-          <a:xfrm rot="21070882">
-            <a:off x="1403178" y="1019804"/>
-            <a:ext cx="6328144" cy="2133526"/>
-          </a:xfrm>
-        </p:spPr>
-        <p:txBody>
-          <a:bodyPr>
-            <a:normAutofit/>
-          </a:bodyPr>
-          <a:lstStyle/>
-          <a:p>
-            <a:r>
-              <a:rPr lang="en-GB" sz="8000" dirty="0"/>
-              <a:t>Who</a:t>
-            </a:r>
-            <a:r>
-              <a:rPr lang="en-GB" sz="6000" dirty="0"/>
-              <a:t> is it </a:t>
-            </a:r>
+          <a:xfrm rot="21129191">
+            <a:off x="839129" y="791913"/>
+            <a:ext cx="6665105" cy="1325563"/>
+          </a:xfrm>
+        </p:spPr>
+        <p:txBody>
+          <a:bodyPr/>
+          <a:lstStyle/>
+          <a:p>
             <a:r>
               <a:rPr lang="en-GB" sz="7200" dirty="0"/>
-              <a:t>for</a:t>
-            </a:r>
-            <a:r>
-              <a:rPr lang="en-GB" sz="8000" dirty="0"/>
-              <a:t>?</a:t>
-            </a:r>
-            <a:endParaRPr lang="en-GB" sz="6000" dirty="0"/>
+              <a:t>Production</a:t>
+            </a:r>
+            <a:r>
+              <a:rPr lang="en-GB" dirty="0"/>
+              <a:t> </a:t>
+            </a:r>
+            <a:r>
+              <a:rPr lang="en-GB" sz="6600" dirty="0"/>
+              <a:t>cycle</a:t>
+            </a:r>
+            <a:endParaRPr lang="en-GB" dirty="0"/>
           </a:p>
         </p:txBody>
       </p:sp>
       <p:pic>
         <p:nvPicPr>
-          <p:cNvPr id="4" name="Picture 3"/>
+          <p:cNvPr id="10" name="Content Placeholder 3"/>
           <p:cNvPicPr>
             <a:picLocks noChangeAspect="1"/>
           </p:cNvPicPr>
@@ -6556,8 +6885,8 @@
         </p:blipFill>
         <p:spPr>
           <a:xfrm>
-            <a:off x="-7070651" y="1469066"/>
-            <a:ext cx="9565758" cy="9565758"/>
+            <a:off x="4555861" y="5658233"/>
+            <a:ext cx="1199767" cy="1199767"/>
           </a:xfrm>
           <a:prstGeom prst="rect">
             <a:avLst/>
@@ -6566,7 +6895,343 @@
       </p:pic>
       <p:pic>
         <p:nvPicPr>
-          <p:cNvPr id="5" name="Picture 4"/>
+          <p:cNvPr id="12" name="Content Placeholder 3"/>
+          <p:cNvPicPr>
+            <a:picLocks noChangeAspect="1"/>
+          </p:cNvPicPr>
+          <p:nvPr/>
+        </p:nvPicPr>
+        <p:blipFill>
+          <a:blip r:embed="rId2"/>
+          <a:stretch>
+            <a:fillRect/>
+          </a:stretch>
+        </p:blipFill>
+        <p:spPr>
+          <a:xfrm>
+            <a:off x="8153263" y="2058929"/>
+            <a:ext cx="1199767" cy="1199767"/>
+          </a:xfrm>
+          <a:prstGeom prst="rect">
+            <a:avLst/>
+          </a:prstGeom>
+        </p:spPr>
+      </p:pic>
+      <p:pic>
+        <p:nvPicPr>
+          <p:cNvPr id="13" name="Content Placeholder 3"/>
+          <p:cNvPicPr>
+            <a:picLocks noChangeAspect="1"/>
+          </p:cNvPicPr>
+          <p:nvPr/>
+        </p:nvPicPr>
+        <p:blipFill>
+          <a:blip r:embed="rId2"/>
+          <a:stretch>
+            <a:fillRect/>
+          </a:stretch>
+        </p:blipFill>
+        <p:spPr>
+          <a:xfrm>
+            <a:off x="6955392" y="2058929"/>
+            <a:ext cx="1199767" cy="1199767"/>
+          </a:xfrm>
+          <a:prstGeom prst="rect">
+            <a:avLst/>
+          </a:prstGeom>
+        </p:spPr>
+      </p:pic>
+      <p:pic>
+        <p:nvPicPr>
+          <p:cNvPr id="14" name="Content Placeholder 3"/>
+          <p:cNvPicPr>
+            <a:picLocks noChangeAspect="1"/>
+          </p:cNvPicPr>
+          <p:nvPr/>
+        </p:nvPicPr>
+        <p:blipFill>
+          <a:blip r:embed="rId2"/>
+          <a:stretch>
+            <a:fillRect/>
+          </a:stretch>
+        </p:blipFill>
+        <p:spPr>
+          <a:xfrm>
+            <a:off x="5753730" y="2058928"/>
+            <a:ext cx="1199767" cy="1199767"/>
+          </a:xfrm>
+          <a:prstGeom prst="rect">
+            <a:avLst/>
+          </a:prstGeom>
+        </p:spPr>
+      </p:pic>
+      <p:pic>
+        <p:nvPicPr>
+          <p:cNvPr id="15" name="Content Placeholder 3"/>
+          <p:cNvPicPr>
+            <a:picLocks noChangeAspect="1"/>
+          </p:cNvPicPr>
+          <p:nvPr/>
+        </p:nvPicPr>
+        <p:blipFill>
+          <a:blip r:embed="rId2"/>
+          <a:stretch>
+            <a:fillRect/>
+          </a:stretch>
+        </p:blipFill>
+        <p:spPr>
+          <a:xfrm>
+            <a:off x="4559653" y="3258699"/>
+            <a:ext cx="1199767" cy="1199767"/>
+          </a:xfrm>
+          <a:prstGeom prst="rect">
+            <a:avLst/>
+          </a:prstGeom>
+        </p:spPr>
+      </p:pic>
+      <p:pic>
+        <p:nvPicPr>
+          <p:cNvPr id="16" name="Content Placeholder 3"/>
+          <p:cNvPicPr>
+            <a:picLocks noChangeAspect="1"/>
+          </p:cNvPicPr>
+          <p:nvPr/>
+        </p:nvPicPr>
+        <p:blipFill>
+          <a:blip r:embed="rId2"/>
+          <a:stretch>
+            <a:fillRect/>
+          </a:stretch>
+        </p:blipFill>
+        <p:spPr>
+          <a:xfrm>
+            <a:off x="9353029" y="2058929"/>
+            <a:ext cx="1199767" cy="1199767"/>
+          </a:xfrm>
+          <a:prstGeom prst="rect">
+            <a:avLst/>
+          </a:prstGeom>
+        </p:spPr>
+      </p:pic>
+      <p:pic>
+        <p:nvPicPr>
+          <p:cNvPr id="17" name="Content Placeholder 3"/>
+          <p:cNvPicPr>
+            <a:picLocks noChangeAspect="1"/>
+          </p:cNvPicPr>
+          <p:nvPr/>
+        </p:nvPicPr>
+        <p:blipFill>
+          <a:blip r:embed="rId2"/>
+          <a:stretch>
+            <a:fillRect/>
+          </a:stretch>
+        </p:blipFill>
+        <p:spPr>
+          <a:xfrm>
+            <a:off x="4557757" y="4458464"/>
+            <a:ext cx="1199767" cy="1199767"/>
+          </a:xfrm>
+          <a:prstGeom prst="rect">
+            <a:avLst/>
+          </a:prstGeom>
+        </p:spPr>
+      </p:pic>
+      <p:pic>
+        <p:nvPicPr>
+          <p:cNvPr id="18" name="Content Placeholder 3"/>
+          <p:cNvPicPr>
+            <a:picLocks noChangeAspect="1"/>
+          </p:cNvPicPr>
+          <p:nvPr/>
+        </p:nvPicPr>
+        <p:blipFill>
+          <a:blip r:embed="rId2"/>
+          <a:stretch>
+            <a:fillRect/>
+          </a:stretch>
+        </p:blipFill>
+        <p:spPr>
+          <a:xfrm>
+            <a:off x="4552068" y="2058924"/>
+            <a:ext cx="1199767" cy="1199767"/>
+          </a:xfrm>
+          <a:prstGeom prst="rect">
+            <a:avLst/>
+          </a:prstGeom>
+        </p:spPr>
+      </p:pic>
+      <p:pic>
+        <p:nvPicPr>
+          <p:cNvPr id="19" name="Content Placeholder 3"/>
+          <p:cNvPicPr>
+            <a:picLocks noChangeAspect="1"/>
+          </p:cNvPicPr>
+          <p:nvPr/>
+        </p:nvPicPr>
+        <p:blipFill>
+          <a:blip r:embed="rId2"/>
+          <a:stretch>
+            <a:fillRect/>
+          </a:stretch>
+        </p:blipFill>
+        <p:spPr>
+          <a:xfrm>
+            <a:off x="9335048" y="4458463"/>
+            <a:ext cx="1199767" cy="1199767"/>
+          </a:xfrm>
+          <a:prstGeom prst="rect">
+            <a:avLst/>
+          </a:prstGeom>
+        </p:spPr>
+      </p:pic>
+      <p:pic>
+        <p:nvPicPr>
+          <p:cNvPr id="20" name="Content Placeholder 3"/>
+          <p:cNvPicPr>
+            <a:picLocks noChangeAspect="1"/>
+          </p:cNvPicPr>
+          <p:nvPr/>
+        </p:nvPicPr>
+        <p:blipFill>
+          <a:blip r:embed="rId2"/>
+          <a:stretch>
+            <a:fillRect/>
+          </a:stretch>
+        </p:blipFill>
+        <p:spPr>
+          <a:xfrm>
+            <a:off x="8153262" y="4467153"/>
+            <a:ext cx="1199767" cy="1199767"/>
+          </a:xfrm>
+          <a:prstGeom prst="rect">
+            <a:avLst/>
+          </a:prstGeom>
+        </p:spPr>
+      </p:pic>
+      <p:pic>
+        <p:nvPicPr>
+          <p:cNvPr id="21" name="Content Placeholder 3"/>
+          <p:cNvPicPr>
+            <a:picLocks noChangeAspect="1"/>
+          </p:cNvPicPr>
+          <p:nvPr/>
+        </p:nvPicPr>
+        <p:blipFill>
+          <a:blip r:embed="rId2"/>
+          <a:stretch>
+            <a:fillRect/>
+          </a:stretch>
+        </p:blipFill>
+        <p:spPr>
+          <a:xfrm>
+            <a:off x="6969361" y="4467154"/>
+            <a:ext cx="1199767" cy="1199767"/>
+          </a:xfrm>
+          <a:prstGeom prst="rect">
+            <a:avLst/>
+          </a:prstGeom>
+        </p:spPr>
+      </p:pic>
+      <p:pic>
+        <p:nvPicPr>
+          <p:cNvPr id="22" name="Content Placeholder 3"/>
+          <p:cNvPicPr>
+            <a:picLocks noChangeAspect="1"/>
+          </p:cNvPicPr>
+          <p:nvPr/>
+        </p:nvPicPr>
+        <p:blipFill>
+          <a:blip r:embed="rId2"/>
+          <a:stretch>
+            <a:fillRect/>
+          </a:stretch>
+        </p:blipFill>
+        <p:spPr>
+          <a:xfrm>
+            <a:off x="6973644" y="5664999"/>
+            <a:ext cx="1199767" cy="1199767"/>
+          </a:xfrm>
+          <a:prstGeom prst="rect">
+            <a:avLst/>
+          </a:prstGeom>
+        </p:spPr>
+      </p:pic>
+      <p:pic>
+        <p:nvPicPr>
+          <p:cNvPr id="24" name="Content Placeholder 3"/>
+          <p:cNvPicPr>
+            <a:picLocks noChangeAspect="1"/>
+          </p:cNvPicPr>
+          <p:nvPr/>
+        </p:nvPicPr>
+        <p:blipFill>
+          <a:blip r:embed="rId2"/>
+          <a:stretch>
+            <a:fillRect/>
+          </a:stretch>
+        </p:blipFill>
+        <p:spPr>
+          <a:xfrm>
+            <a:off x="10525825" y="4440394"/>
+            <a:ext cx="1199767" cy="1199767"/>
+          </a:xfrm>
+          <a:prstGeom prst="rect">
+            <a:avLst/>
+          </a:prstGeom>
+        </p:spPr>
+      </p:pic>
+      <p:pic>
+        <p:nvPicPr>
+          <p:cNvPr id="25" name="Content Placeholder 3"/>
+          <p:cNvPicPr>
+            <a:picLocks noChangeAspect="1"/>
+          </p:cNvPicPr>
+          <p:nvPr/>
+        </p:nvPicPr>
+        <p:blipFill>
+          <a:blip r:embed="rId2"/>
+          <a:stretch>
+            <a:fillRect/>
+          </a:stretch>
+        </p:blipFill>
+        <p:spPr>
+          <a:xfrm>
+            <a:off x="11744978" y="2058923"/>
+            <a:ext cx="1199767" cy="1199767"/>
+          </a:xfrm>
+          <a:prstGeom prst="rect">
+            <a:avLst/>
+          </a:prstGeom>
+        </p:spPr>
+      </p:pic>
+      <p:pic>
+        <p:nvPicPr>
+          <p:cNvPr id="26" name="Content Placeholder 3"/>
+          <p:cNvPicPr>
+            <a:picLocks noChangeAspect="1"/>
+          </p:cNvPicPr>
+          <p:nvPr/>
+        </p:nvPicPr>
+        <p:blipFill>
+          <a:blip r:embed="rId2"/>
+          <a:stretch>
+            <a:fillRect/>
+          </a:stretch>
+        </p:blipFill>
+        <p:spPr>
+          <a:xfrm>
+            <a:off x="10550901" y="2066156"/>
+            <a:ext cx="1199767" cy="1199767"/>
+          </a:xfrm>
+          <a:prstGeom prst="rect">
+            <a:avLst/>
+          </a:prstGeom>
+        </p:spPr>
+      </p:pic>
+      <p:pic>
+        <p:nvPicPr>
+          <p:cNvPr id="27" name="Picture 26"/>
           <p:cNvPicPr>
             <a:picLocks noChangeAspect="1"/>
           </p:cNvPicPr>
@@ -6580,8 +7245,200 @@
         </p:blipFill>
         <p:spPr>
           <a:xfrm>
-            <a:off x="7857460" y="1187394"/>
-            <a:ext cx="4876800" cy="4876800"/>
+            <a:off x="5759420" y="5643776"/>
+            <a:ext cx="1214224" cy="1214224"/>
+          </a:xfrm>
+          <a:prstGeom prst="rect">
+            <a:avLst/>
+          </a:prstGeom>
+        </p:spPr>
+      </p:pic>
+      <p:pic>
+        <p:nvPicPr>
+          <p:cNvPr id="28" name="Picture 27"/>
+          <p:cNvPicPr>
+            <a:picLocks noChangeAspect="1"/>
+          </p:cNvPicPr>
+          <p:nvPr/>
+        </p:nvPicPr>
+        <p:blipFill>
+          <a:blip r:embed="rId3"/>
+          <a:stretch>
+            <a:fillRect/>
+          </a:stretch>
+        </p:blipFill>
+        <p:spPr>
+          <a:xfrm>
+            <a:off x="6949616" y="3254852"/>
+            <a:ext cx="1214224" cy="1214224"/>
+          </a:xfrm>
+          <a:prstGeom prst="rect">
+            <a:avLst/>
+          </a:prstGeom>
+        </p:spPr>
+      </p:pic>
+      <p:pic>
+        <p:nvPicPr>
+          <p:cNvPr id="29" name="Picture 28"/>
+          <p:cNvPicPr>
+            <a:picLocks noChangeAspect="1"/>
+          </p:cNvPicPr>
+          <p:nvPr/>
+        </p:nvPicPr>
+        <p:blipFill>
+          <a:blip r:embed="rId3"/>
+          <a:stretch>
+            <a:fillRect/>
+          </a:stretch>
+        </p:blipFill>
+        <p:spPr>
+          <a:xfrm>
+            <a:off x="5739273" y="3258700"/>
+            <a:ext cx="1214224" cy="1214224"/>
+          </a:xfrm>
+          <a:prstGeom prst="rect">
+            <a:avLst/>
+          </a:prstGeom>
+        </p:spPr>
+      </p:pic>
+      <p:pic>
+        <p:nvPicPr>
+          <p:cNvPr id="30" name="Picture 29"/>
+          <p:cNvPicPr>
+            <a:picLocks noChangeAspect="1"/>
+          </p:cNvPicPr>
+          <p:nvPr/>
+        </p:nvPicPr>
+        <p:blipFill>
+          <a:blip r:embed="rId3"/>
+          <a:stretch>
+            <a:fillRect/>
+          </a:stretch>
+        </p:blipFill>
+        <p:spPr>
+          <a:xfrm>
+            <a:off x="5759420" y="4444006"/>
+            <a:ext cx="1214224" cy="1214224"/>
+          </a:xfrm>
+          <a:prstGeom prst="rect">
+            <a:avLst/>
+          </a:prstGeom>
+        </p:spPr>
+      </p:pic>
+      <p:pic>
+        <p:nvPicPr>
+          <p:cNvPr id="31" name="Picture 30"/>
+          <p:cNvPicPr>
+            <a:picLocks noChangeAspect="1"/>
+          </p:cNvPicPr>
+          <p:nvPr/>
+        </p:nvPicPr>
+        <p:blipFill>
+          <a:blip r:embed="rId3"/>
+          <a:stretch>
+            <a:fillRect/>
+          </a:stretch>
+        </p:blipFill>
+        <p:spPr>
+          <a:xfrm>
+            <a:off x="11745708" y="3246047"/>
+            <a:ext cx="1214224" cy="1214224"/>
+          </a:xfrm>
+          <a:prstGeom prst="rect">
+            <a:avLst/>
+          </a:prstGeom>
+        </p:spPr>
+      </p:pic>
+      <p:pic>
+        <p:nvPicPr>
+          <p:cNvPr id="32" name="Picture 31"/>
+          <p:cNvPicPr>
+            <a:picLocks noChangeAspect="1"/>
+          </p:cNvPicPr>
+          <p:nvPr/>
+        </p:nvPicPr>
+        <p:blipFill>
+          <a:blip r:embed="rId3"/>
+          <a:stretch>
+            <a:fillRect/>
+          </a:stretch>
+        </p:blipFill>
+        <p:spPr>
+          <a:xfrm>
+            <a:off x="10563922" y="3226170"/>
+            <a:ext cx="1214224" cy="1214224"/>
+          </a:xfrm>
+          <a:prstGeom prst="rect">
+            <a:avLst/>
+          </a:prstGeom>
+        </p:spPr>
+      </p:pic>
+      <p:pic>
+        <p:nvPicPr>
+          <p:cNvPr id="33" name="Picture 32"/>
+          <p:cNvPicPr>
+            <a:picLocks noChangeAspect="1"/>
+          </p:cNvPicPr>
+          <p:nvPr/>
+        </p:nvPicPr>
+        <p:blipFill>
+          <a:blip r:embed="rId3"/>
+          <a:stretch>
+            <a:fillRect/>
+          </a:stretch>
+        </p:blipFill>
+        <p:spPr>
+          <a:xfrm>
+            <a:off x="9352141" y="3242317"/>
+            <a:ext cx="1214224" cy="1214224"/>
+          </a:xfrm>
+          <a:prstGeom prst="rect">
+            <a:avLst/>
+          </a:prstGeom>
+        </p:spPr>
+      </p:pic>
+      <p:pic>
+        <p:nvPicPr>
+          <p:cNvPr id="34" name="Picture 33"/>
+          <p:cNvPicPr>
+            <a:picLocks noChangeAspect="1"/>
+          </p:cNvPicPr>
+          <p:nvPr/>
+        </p:nvPicPr>
+        <p:blipFill>
+          <a:blip r:embed="rId3"/>
+          <a:stretch>
+            <a:fillRect/>
+          </a:stretch>
+        </p:blipFill>
+        <p:spPr>
+          <a:xfrm>
+            <a:off x="8159557" y="3247122"/>
+            <a:ext cx="1214224" cy="1214224"/>
+          </a:xfrm>
+          <a:prstGeom prst="rect">
+            <a:avLst/>
+          </a:prstGeom>
+        </p:spPr>
+      </p:pic>
+      <p:pic>
+        <p:nvPicPr>
+          <p:cNvPr id="23" name="Content Placeholder 3"/>
+          <p:cNvPicPr>
+            <a:picLocks noChangeAspect="1"/>
+          </p:cNvPicPr>
+          <p:nvPr/>
+        </p:nvPicPr>
+        <p:blipFill>
+          <a:blip r:embed="rId2"/>
+          <a:stretch>
+            <a:fillRect/>
+          </a:stretch>
+        </p:blipFill>
+        <p:spPr>
+          <a:xfrm>
+            <a:off x="11707611" y="4425937"/>
+            <a:ext cx="1199767" cy="1199767"/>
           </a:xfrm>
           <a:prstGeom prst="rect">
             <a:avLst/>
@@ -6591,7 +7448,7 @@
     </p:spTree>
     <p:extLst>
       <p:ext uri="{BB962C8B-B14F-4D97-AF65-F5344CB8AC3E}">
-        <p14:creationId xmlns:p14="http://schemas.microsoft.com/office/powerpoint/2010/main" val="1291827028"/>
+        <p14:creationId xmlns:p14="http://schemas.microsoft.com/office/powerpoint/2010/main" val="1662958355"/>
       </p:ext>
     </p:extLst>
   </p:cSld>
@@ -6618,9 +7475,51 @@
           <a:chExt cx="0" cy="0"/>
         </a:xfrm>
       </p:grpSpPr>
+      <p:sp>
+        <p:nvSpPr>
+          <p:cNvPr id="2" name="Title 1"/>
+          <p:cNvSpPr>
+            <a:spLocks noGrp="1"/>
+          </p:cNvSpPr>
+          <p:nvPr>
+            <p:ph type="title"/>
+          </p:nvPr>
+        </p:nvSpPr>
+        <p:spPr>
+          <a:xfrm rot="21070882">
+            <a:off x="1403178" y="1019804"/>
+            <a:ext cx="6328144" cy="2133526"/>
+          </a:xfrm>
+        </p:spPr>
+        <p:txBody>
+          <a:bodyPr>
+            <a:normAutofit/>
+          </a:bodyPr>
+          <a:lstStyle/>
+          <a:p>
+            <a:r>
+              <a:rPr lang="en-GB" sz="8000" dirty="0"/>
+              <a:t>Who</a:t>
+            </a:r>
+            <a:r>
+              <a:rPr lang="en-GB" sz="6000" dirty="0"/>
+              <a:t> is it </a:t>
+            </a:r>
+            <a:r>
+              <a:rPr lang="en-GB" sz="7200" dirty="0"/>
+              <a:t>for</a:t>
+            </a:r>
+            <a:r>
+              <a:rPr lang="en-GB" sz="8000" dirty="0"/>
+              <a:t>?</a:t>
+            </a:r>
+            <a:endParaRPr lang="en-GB" sz="6000" dirty="0"/>
+          </a:p>
+        </p:txBody>
+      </p:sp>
       <p:pic>
         <p:nvPicPr>
-          <p:cNvPr id="5" name="Picture 4"/>
+          <p:cNvPr id="4" name="Picture 3"/>
           <p:cNvPicPr>
             <a:picLocks noChangeAspect="1"/>
           </p:cNvPicPr>
@@ -6634,8 +7533,8 @@
         </p:blipFill>
         <p:spPr>
           <a:xfrm>
-            <a:off x="191386" y="1795131"/>
-            <a:ext cx="5560828" cy="5560828"/>
+            <a:off x="-7070651" y="1469066"/>
+            <a:ext cx="9565758" cy="9565758"/>
           </a:xfrm>
           <a:prstGeom prst="rect">
             <a:avLst/>
@@ -6644,288 +7543,32 @@
       </p:pic>
       <p:pic>
         <p:nvPicPr>
-          <p:cNvPr id="1026" name="Picture 2" descr="https://images.discordapp.net/.eJwNx0sKwyAQANC7uI-f0akmdygUcgARIxpIVHS6Kr17-3bvw97jYhsrRH1uQhznjG0cfFIbISeeW8tXCv2cPLZbBKIQy50qTQEaDeKqjEIFxjoLAhC1htVpdM46kE6JPY6Uqt9LIw9SPRYFi0Qf_uNScmn868l7zez7A1wvKl4.bKZ-9qWSCqwxBQdCjc0VJ_5OuAA?width=178&amp;height=299"/>
+          <p:cNvPr id="5" name="Picture 4"/>
           <p:cNvPicPr>
-            <a:picLocks noChangeAspect="1" noChangeArrowheads="1"/>
+            <a:picLocks noChangeAspect="1"/>
           </p:cNvPicPr>
           <p:nvPr/>
         </p:nvPicPr>
         <p:blipFill>
-          <a:blip r:embed="rId3">
-            <a:extLst>
-              <a:ext uri="{28A0092B-C50C-407E-A947-70E740481C1C}">
-                <a14:useLocalDpi xmlns:a14="http://schemas.microsoft.com/office/drawing/2010/main" val="0"/>
-              </a:ext>
-            </a:extLst>
-          </a:blip>
-          <a:srcRect/>
+          <a:blip r:embed="rId3"/>
           <a:stretch>
             <a:fillRect/>
           </a:stretch>
         </p:blipFill>
-        <p:spPr bwMode="auto">
-          <a:xfrm>
-            <a:off x="310006" y="366381"/>
-            <a:ext cx="1704975" cy="2857500"/>
+        <p:spPr>
+          <a:xfrm>
+            <a:off x="7857460" y="1187394"/>
+            <a:ext cx="4876800" cy="4876800"/>
           </a:xfrm>
           <a:prstGeom prst="rect">
             <a:avLst/>
           </a:prstGeom>
-          <a:noFill/>
-          <a:extLst>
-            <a:ext uri="{909E8E84-426E-40DD-AFC4-6F175D3DCCD1}">
-              <a14:hiddenFill xmlns:a14="http://schemas.microsoft.com/office/drawing/2010/main">
-                <a:solidFill>
-                  <a:srgbClr val="FFFFFF"/>
-                </a:solidFill>
-              </a14:hiddenFill>
-            </a:ext>
-          </a:extLst>
-        </p:spPr>
-      </p:pic>
-      <p:pic>
-        <p:nvPicPr>
-          <p:cNvPr id="1028" name="Picture 4" descr="https://images.discordapp.net/.eJwNx0EOgyAQAMC_cBfYlQXxDyZNfAAhSNBExcD21PTv7dzmI97tFLPYmZ8-K7UdPdW2yc61xZJlqbWcOT5Hl6leKjLHtF_55q5wJEPkwQABGjc5VEg0jui9J-eMnTxOak0t5zuse-WAGuwAOGgK8T-pQYINr0U-dxHfH19VKnI.z8zELZdhowkhpP5NtKfv_Gns8Vk?width=174&amp;height=300"/>
-          <p:cNvPicPr>
-            <a:picLocks noChangeAspect="1" noChangeArrowheads="1"/>
-          </p:cNvPicPr>
-          <p:nvPr/>
-        </p:nvPicPr>
-        <p:blipFill>
-          <a:blip r:embed="rId4">
-            <a:extLst>
-              <a:ext uri="{28A0092B-C50C-407E-A947-70E740481C1C}">
-                <a14:useLocalDpi xmlns:a14="http://schemas.microsoft.com/office/drawing/2010/main" val="0"/>
-              </a:ext>
-            </a:extLst>
-          </a:blip>
-          <a:srcRect/>
-          <a:stretch>
-            <a:fillRect/>
-          </a:stretch>
-        </p:blipFill>
-        <p:spPr bwMode="auto">
-          <a:xfrm>
-            <a:off x="2375269" y="366381"/>
-            <a:ext cx="1657350" cy="2857500"/>
-          </a:xfrm>
-          <a:prstGeom prst="rect">
-            <a:avLst/>
-          </a:prstGeom>
-          <a:noFill/>
-          <a:extLst>
-            <a:ext uri="{909E8E84-426E-40DD-AFC4-6F175D3DCCD1}">
-              <a14:hiddenFill xmlns:a14="http://schemas.microsoft.com/office/drawing/2010/main">
-                <a:solidFill>
-                  <a:srgbClr val="FFFFFF"/>
-                </a:solidFill>
-              </a14:hiddenFill>
-            </a:ext>
-          </a:extLst>
-        </p:spPr>
-      </p:pic>
-      <p:pic>
-        <p:nvPicPr>
-          <p:cNvPr id="1030" name="Picture 6" descr="https://images.discordapp.net/.eJwNx0EKwyAQAMC_eI-uq1tr_hAo5AEiRjSQxKDbU-nf27nNR7z7IWZRme8xK7XtI7W-ycGtx5Jlaa0cOd77kKmdKjLHVM988VBoyBJ5bTVptO7pUCGRMQbAeweeLFpQa-o5X2GtjQOCfkwaJ6AQ_5MAkii8FnlfRXx_WQAqUw.7qJYaRMvbBRIXi0JnYoaqHzleG4?width=173&amp;height=300"/>
-          <p:cNvPicPr>
-            <a:picLocks noChangeAspect="1" noChangeArrowheads="1"/>
-          </p:cNvPicPr>
-          <p:nvPr/>
-        </p:nvPicPr>
-        <p:blipFill>
-          <a:blip r:embed="rId5">
-            <a:extLst>
-              <a:ext uri="{28A0092B-C50C-407E-A947-70E740481C1C}">
-                <a14:useLocalDpi xmlns:a14="http://schemas.microsoft.com/office/drawing/2010/main" val="0"/>
-              </a:ext>
-            </a:extLst>
-          </a:blip>
-          <a:srcRect/>
-          <a:stretch>
-            <a:fillRect/>
-          </a:stretch>
-        </p:blipFill>
-        <p:spPr bwMode="auto">
-          <a:xfrm>
-            <a:off x="4423254" y="366381"/>
-            <a:ext cx="1657350" cy="2857500"/>
-          </a:xfrm>
-          <a:prstGeom prst="rect">
-            <a:avLst/>
-          </a:prstGeom>
-          <a:noFill/>
-          <a:extLst>
-            <a:ext uri="{909E8E84-426E-40DD-AFC4-6F175D3DCCD1}">
-              <a14:hiddenFill xmlns:a14="http://schemas.microsoft.com/office/drawing/2010/main">
-                <a:solidFill>
-                  <a:srgbClr val="FFFFFF"/>
-                </a:solidFill>
-              </a14:hiddenFill>
-            </a:ext>
-          </a:extLst>
-        </p:spPr>
-      </p:pic>
-      <p:sp>
-        <p:nvSpPr>
-          <p:cNvPr id="10" name="Title 1"/>
-          <p:cNvSpPr>
-            <a:spLocks noGrp="1"/>
-          </p:cNvSpPr>
-          <p:nvPr>
-            <p:ph type="title"/>
-          </p:nvPr>
-        </p:nvSpPr>
-        <p:spPr>
-          <a:xfrm>
-            <a:off x="6080604" y="6220046"/>
-            <a:ext cx="6021018" cy="435935"/>
-          </a:xfrm>
-        </p:spPr>
-        <p:txBody>
-          <a:bodyPr>
-            <a:noAutofit/>
-          </a:bodyPr>
-          <a:lstStyle/>
-          <a:p>
-            <a:r>
-              <a:rPr lang="en-GB" sz="2000" dirty="0"/>
-              <a:t>Figures and images courtesy of Steam and </a:t>
-            </a:r>
-            <a:r>
-              <a:rPr lang="en-GB" sz="2000" dirty="0" err="1"/>
-              <a:t>Steamspy</a:t>
-            </a:r>
-            <a:endParaRPr lang="en-GB" sz="2000" dirty="0"/>
-          </a:p>
-        </p:txBody>
-      </p:sp>
-      <p:pic>
-        <p:nvPicPr>
-          <p:cNvPr id="1032" name="Picture 8" descr="https://images.discordapp.net/.eJwNx0EOgyAQAMC_cBfYhVXxDyZNfAAhSMBExcD21PTv7dzmI97tFIsozE9flNqPHmvbZefaQk4y15rPFJ6jy1gvFZhDLFe6uSs0ZIkcWCBAO80TKiQyxpC2NBqcwSGoLbaUbr-Vyh41jAPgoMmH_6Q2kpx_rfK5s_j-AFisKlc.BaSURPhs-I1uHZsvCJl8CBYuzFs?width=194&amp;height=300"/>
-          <p:cNvPicPr>
-            <a:picLocks noChangeAspect="1" noChangeArrowheads="1"/>
-          </p:cNvPicPr>
-          <p:nvPr/>
-        </p:nvPicPr>
-        <p:blipFill>
-          <a:blip r:embed="rId6">
-            <a:extLst>
-              <a:ext uri="{28A0092B-C50C-407E-A947-70E740481C1C}">
-                <a14:useLocalDpi xmlns:a14="http://schemas.microsoft.com/office/drawing/2010/main" val="0"/>
-              </a:ext>
-            </a:extLst>
-          </a:blip>
-          <a:srcRect/>
-          <a:stretch>
-            <a:fillRect/>
-          </a:stretch>
-        </p:blipFill>
-        <p:spPr bwMode="auto">
-          <a:xfrm>
-            <a:off x="6471239" y="366381"/>
-            <a:ext cx="1847850" cy="2857500"/>
-          </a:xfrm>
-          <a:prstGeom prst="rect">
-            <a:avLst/>
-          </a:prstGeom>
-          <a:noFill/>
-          <a:extLst>
-            <a:ext uri="{909E8E84-426E-40DD-AFC4-6F175D3DCCD1}">
-              <a14:hiddenFill xmlns:a14="http://schemas.microsoft.com/office/drawing/2010/main">
-                <a:solidFill>
-                  <a:srgbClr val="FFFFFF"/>
-                </a:solidFill>
-              </a14:hiddenFill>
-            </a:ext>
-          </a:extLst>
-        </p:spPr>
-      </p:pic>
-      <p:pic>
-        <p:nvPicPr>
-          <p:cNvPr id="1034" name="Picture 10" descr="https://images.discordapp.net/.eJwNx0sKwyAQANC7uI-f0dEmdwgUcgARIxpINOh0VXr35u3el336yRZWiO6xCLEfI7a-80Gth5x4bi2fKdzH4LFdIhCFWK5UaQjQaBBnZRQqMO7lQACi1np2z8Eahwhiiz2l6rfSyINUdlIwSfThGZfIjfXvld81s98fWjkqXQ.QRl0AtXUREpAqblfh7ijm-mvu9Q?width=242&amp;height=300"/>
-          <p:cNvPicPr>
-            <a:picLocks noChangeAspect="1" noChangeArrowheads="1"/>
-          </p:cNvPicPr>
-          <p:nvPr/>
-        </p:nvPicPr>
-        <p:blipFill>
-          <a:blip r:embed="rId7">
-            <a:extLst>
-              <a:ext uri="{28A0092B-C50C-407E-A947-70E740481C1C}">
-                <a14:useLocalDpi xmlns:a14="http://schemas.microsoft.com/office/drawing/2010/main" val="0"/>
-              </a:ext>
-            </a:extLst>
-          </a:blip>
-          <a:srcRect/>
-          <a:stretch>
-            <a:fillRect/>
-          </a:stretch>
-        </p:blipFill>
-        <p:spPr bwMode="auto">
-          <a:xfrm>
-            <a:off x="8628210" y="366381"/>
-            <a:ext cx="2314575" cy="2857500"/>
-          </a:xfrm>
-          <a:prstGeom prst="rect">
-            <a:avLst/>
-          </a:prstGeom>
-          <a:noFill/>
-          <a:extLst>
-            <a:ext uri="{909E8E84-426E-40DD-AFC4-6F175D3DCCD1}">
-              <a14:hiddenFill xmlns:a14="http://schemas.microsoft.com/office/drawing/2010/main">
-                <a:solidFill>
-                  <a:srgbClr val="FFFFFF"/>
-                </a:solidFill>
-              </a14:hiddenFill>
-            </a:ext>
-          </a:extLst>
-        </p:spPr>
-      </p:pic>
-      <p:pic>
-        <p:nvPicPr>
-          <p:cNvPr id="1038" name="Picture 14" descr="https://images.discordapp.net/.eJwNyEEKwyAQAMC_eI-66hqbPwQKeYCIEQ0kGnR7Kv17c5z5sk8_2cIK0T0WIfZjxNZ3Pqj1kBPPreUzhfsYPLZLBKIQy5UqDaE0GsQXGEBQZnazEgpRawRrHDwNxlqxxZ5S9Vtp5JUEO4GaJPrwiIPk4Px75XfN7PcHWCoqTw.MgD0hw6FR45Br6Px6A-N4OHy00w?width=400&amp;height=256"/>
-          <p:cNvPicPr>
-            <a:picLocks noChangeAspect="1" noChangeArrowheads="1"/>
-          </p:cNvPicPr>
-          <p:nvPr/>
-        </p:nvPicPr>
-        <p:blipFill>
-          <a:blip r:embed="rId8">
-            <a:extLst>
-              <a:ext uri="{28A0092B-C50C-407E-A947-70E740481C1C}">
-                <a14:useLocalDpi xmlns:a14="http://schemas.microsoft.com/office/drawing/2010/main" val="0"/>
-              </a:ext>
-            </a:extLst>
-          </a:blip>
-          <a:srcRect/>
-          <a:stretch>
-            <a:fillRect/>
-          </a:stretch>
-        </p:blipFill>
-        <p:spPr bwMode="auto">
-          <a:xfrm>
-            <a:off x="7132785" y="3502763"/>
-            <a:ext cx="3810000" cy="2438400"/>
-          </a:xfrm>
-          <a:prstGeom prst="rect">
-            <a:avLst/>
-          </a:prstGeom>
-          <a:noFill/>
-          <a:extLst>
-            <a:ext uri="{909E8E84-426E-40DD-AFC4-6F175D3DCCD1}">
-              <a14:hiddenFill xmlns:a14="http://schemas.microsoft.com/office/drawing/2010/main">
-                <a:solidFill>
-                  <a:srgbClr val="FFFFFF"/>
-                </a:solidFill>
-              </a14:hiddenFill>
-            </a:ext>
-          </a:extLst>
         </p:spPr>
       </p:pic>
     </p:spTree>
     <p:extLst>
       <p:ext uri="{BB962C8B-B14F-4D97-AF65-F5344CB8AC3E}">
-        <p14:creationId xmlns:p14="http://schemas.microsoft.com/office/powerpoint/2010/main" val="3194383160"/>
+        <p14:creationId xmlns:p14="http://schemas.microsoft.com/office/powerpoint/2010/main" val="1291827028"/>
       </p:ext>
     </p:extLst>
   </p:cSld>

</xml_diff>